<commit_message>
Updated graphics in powerpoint
</commit_message>
<xml_diff>
--- a/graphics.pptx
+++ b/graphics.pptx
@@ -13061,7 +13061,7 @@
         <p:spPr>
           <a:xfrm>
             <a:off x="6147459" y="3895321"/>
-            <a:ext cx="5234683" cy="2353168"/>
+            <a:ext cx="5234683" cy="1912038"/>
           </a:xfrm>
           <a:prstGeom prst="roundRect">
             <a:avLst>
@@ -13111,22 +13111,6 @@
               </a:rPr>
               <a:t>ATTITUDE PROPAGATION METHOD</a:t>
             </a:r>
-          </a:p>
-          <a:p>
-            <a:pPr algn="ctr"/>
-            <a:endParaRPr lang="en-US" b="1" dirty="0">
-              <a:solidFill>
-                <a:schemeClr val="tx1"/>
-              </a:solidFill>
-            </a:endParaRPr>
-          </a:p>
-          <a:p>
-            <a:pPr algn="ctr"/>
-            <a:endParaRPr lang="en-US" b="1" dirty="0">
-              <a:solidFill>
-                <a:schemeClr val="tx1"/>
-              </a:solidFill>
-            </a:endParaRPr>
           </a:p>
           <a:p>
             <a:pPr algn="ctr"/>
@@ -13800,7 +13784,7 @@
         <p:spPr>
           <a:xfrm>
             <a:off x="6404567" y="4407701"/>
-            <a:ext cx="4718347" cy="646899"/>
+            <a:ext cx="4718347" cy="811768"/>
           </a:xfrm>
           <a:prstGeom prst="roundRect">
             <a:avLst>
@@ -13950,7 +13934,7 @@
         </p:nvSpPr>
         <p:spPr>
           <a:xfrm>
-            <a:off x="6404567" y="5145382"/>
+            <a:off x="6404567" y="5219469"/>
             <a:ext cx="4673035" cy="261610"/>
           </a:xfrm>
           <a:prstGeom prst="rect">

</xml_diff>

<commit_message>
Major re-organization of figures and stuff
</commit_message>
<xml_diff>
--- a/graphics.pptx
+++ b/graphics.pptx
@@ -5,7 +5,7 @@
     <p:sldMasterId id="2147483648" r:id="rId1"/>
   </p:sldMasterIdLst>
   <p:notesMasterIdLst>
-    <p:notesMasterId r:id="rId14"/>
+    <p:notesMasterId r:id="rId17"/>
   </p:notesMasterIdLst>
   <p:sldIdLst>
     <p:sldId id="256" r:id="rId2"/>
@@ -20,6 +20,9 @@
     <p:sldId id="264" r:id="rId11"/>
     <p:sldId id="266" r:id="rId12"/>
     <p:sldId id="267" r:id="rId13"/>
+    <p:sldId id="268" r:id="rId14"/>
+    <p:sldId id="269" r:id="rId15"/>
+    <p:sldId id="270" r:id="rId16"/>
   </p:sldIdLst>
   <p:sldSz cx="12192000" cy="6858000"/>
   <p:notesSz cx="6858000" cy="9144000"/>
@@ -208,7 +211,7 @@
           <a:p>
             <a:fld id="{30BA6EED-41FB-463F-A202-09D727F1A9E7}" type="datetimeFigureOut">
               <a:rPr lang="en-US" smtClean="0"/>
-              <a:t>4/19/2024</a:t>
+              <a:t>5/1/2024</a:t>
             </a:fld>
             <a:endParaRPr lang="en-US"/>
           </a:p>
@@ -706,7 +709,7 @@
           <a:p>
             <a:fld id="{491F7E70-246B-4D1A-989A-6D49ADA39188}" type="datetimeFigureOut">
               <a:rPr lang="en-US" smtClean="0"/>
-              <a:t>4/19/2024</a:t>
+              <a:t>5/1/2024</a:t>
             </a:fld>
             <a:endParaRPr lang="en-US"/>
           </a:p>
@@ -904,7 +907,7 @@
           <a:p>
             <a:fld id="{491F7E70-246B-4D1A-989A-6D49ADA39188}" type="datetimeFigureOut">
               <a:rPr lang="en-US" smtClean="0"/>
-              <a:t>4/19/2024</a:t>
+              <a:t>5/1/2024</a:t>
             </a:fld>
             <a:endParaRPr lang="en-US"/>
           </a:p>
@@ -1112,7 +1115,7 @@
           <a:p>
             <a:fld id="{491F7E70-246B-4D1A-989A-6D49ADA39188}" type="datetimeFigureOut">
               <a:rPr lang="en-US" smtClean="0"/>
-              <a:t>4/19/2024</a:t>
+              <a:t>5/1/2024</a:t>
             </a:fld>
             <a:endParaRPr lang="en-US"/>
           </a:p>
@@ -1310,7 +1313,7 @@
           <a:p>
             <a:fld id="{491F7E70-246B-4D1A-989A-6D49ADA39188}" type="datetimeFigureOut">
               <a:rPr lang="en-US" smtClean="0"/>
-              <a:t>4/19/2024</a:t>
+              <a:t>5/1/2024</a:t>
             </a:fld>
             <a:endParaRPr lang="en-US"/>
           </a:p>
@@ -1585,7 +1588,7 @@
           <a:p>
             <a:fld id="{491F7E70-246B-4D1A-989A-6D49ADA39188}" type="datetimeFigureOut">
               <a:rPr lang="en-US" smtClean="0"/>
-              <a:t>4/19/2024</a:t>
+              <a:t>5/1/2024</a:t>
             </a:fld>
             <a:endParaRPr lang="en-US"/>
           </a:p>
@@ -1850,7 +1853,7 @@
           <a:p>
             <a:fld id="{491F7E70-246B-4D1A-989A-6D49ADA39188}" type="datetimeFigureOut">
               <a:rPr lang="en-US" smtClean="0"/>
-              <a:t>4/19/2024</a:t>
+              <a:t>5/1/2024</a:t>
             </a:fld>
             <a:endParaRPr lang="en-US"/>
           </a:p>
@@ -2262,7 +2265,7 @@
           <a:p>
             <a:fld id="{491F7E70-246B-4D1A-989A-6D49ADA39188}" type="datetimeFigureOut">
               <a:rPr lang="en-US" smtClean="0"/>
-              <a:t>4/19/2024</a:t>
+              <a:t>5/1/2024</a:t>
             </a:fld>
             <a:endParaRPr lang="en-US"/>
           </a:p>
@@ -2403,7 +2406,7 @@
           <a:p>
             <a:fld id="{491F7E70-246B-4D1A-989A-6D49ADA39188}" type="datetimeFigureOut">
               <a:rPr lang="en-US" smtClean="0"/>
-              <a:t>4/19/2024</a:t>
+              <a:t>5/1/2024</a:t>
             </a:fld>
             <a:endParaRPr lang="en-US"/>
           </a:p>
@@ -2516,7 +2519,7 @@
           <a:p>
             <a:fld id="{491F7E70-246B-4D1A-989A-6D49ADA39188}" type="datetimeFigureOut">
               <a:rPr lang="en-US" smtClean="0"/>
-              <a:t>4/19/2024</a:t>
+              <a:t>5/1/2024</a:t>
             </a:fld>
             <a:endParaRPr lang="en-US"/>
           </a:p>
@@ -2827,7 +2830,7 @@
           <a:p>
             <a:fld id="{491F7E70-246B-4D1A-989A-6D49ADA39188}" type="datetimeFigureOut">
               <a:rPr lang="en-US" smtClean="0"/>
-              <a:t>4/19/2024</a:t>
+              <a:t>5/1/2024</a:t>
             </a:fld>
             <a:endParaRPr lang="en-US"/>
           </a:p>
@@ -3115,7 +3118,7 @@
           <a:p>
             <a:fld id="{491F7E70-246B-4D1A-989A-6D49ADA39188}" type="datetimeFigureOut">
               <a:rPr lang="en-US" smtClean="0"/>
-              <a:t>4/19/2024</a:t>
+              <a:t>5/1/2024</a:t>
             </a:fld>
             <a:endParaRPr lang="en-US"/>
           </a:p>
@@ -3356,7 +3359,7 @@
           <a:p>
             <a:fld id="{491F7E70-246B-4D1A-989A-6D49ADA39188}" type="datetimeFigureOut">
               <a:rPr lang="en-US" smtClean="0"/>
-              <a:t>4/19/2024</a:t>
+              <a:t>5/1/2024</a:t>
             </a:fld>
             <a:endParaRPr lang="en-US"/>
           </a:p>
@@ -9430,10 +9433,3995 @@
           </a:prstGeom>
         </p:spPr>
       </p:pic>
+      <p:pic>
+        <p:nvPicPr>
+          <p:cNvPr id="3" name="Picture 2">
+            <a:extLst>
+              <a:ext uri="{FF2B5EF4-FFF2-40B4-BE49-F238E27FC236}">
+                <a16:creationId xmlns:a16="http://schemas.microsoft.com/office/drawing/2014/main" id="{1B9682A8-F4BF-A155-7390-CEB5C7E34223}"/>
+              </a:ext>
+            </a:extLst>
+          </p:cNvPr>
+          <p:cNvPicPr>
+            <a:picLocks noChangeAspect="1"/>
+          </p:cNvPicPr>
+          <p:nvPr/>
+        </p:nvPicPr>
+        <p:blipFill>
+          <a:blip r:embed="rId3">
+            <a:extLst>
+              <a:ext uri="{28A0092B-C50C-407E-A947-70E740481C1C}">
+                <a14:useLocalDpi xmlns:a14="http://schemas.microsoft.com/office/drawing/2010/main" val="0"/>
+              </a:ext>
+            </a:extLst>
+          </a:blip>
+          <a:stretch>
+            <a:fillRect/>
+          </a:stretch>
+        </p:blipFill>
+        <p:spPr>
+          <a:xfrm>
+            <a:off x="5349065" y="59429"/>
+            <a:ext cx="5967063" cy="6572017"/>
+          </a:xfrm>
+          <a:prstGeom prst="rect">
+            <a:avLst/>
+          </a:prstGeom>
+        </p:spPr>
+      </p:pic>
+      <mc:AlternateContent xmlns:mc="http://schemas.openxmlformats.org/markup-compatibility/2006" xmlns:a14="http://schemas.microsoft.com/office/drawing/2010/main">
+        <mc:Choice Requires="a14">
+          <p:sp>
+            <p:nvSpPr>
+              <p:cNvPr id="4" name="TextBox 3">
+                <a:extLst>
+                  <a:ext uri="{FF2B5EF4-FFF2-40B4-BE49-F238E27FC236}">
+                    <a16:creationId xmlns:a16="http://schemas.microsoft.com/office/drawing/2014/main" id="{B72A3820-4352-C50E-811F-69069EDC475F}"/>
+                  </a:ext>
+                </a:extLst>
+              </p:cNvPr>
+              <p:cNvSpPr txBox="1"/>
+              <p:nvPr/>
+            </p:nvSpPr>
+            <p:spPr>
+              <a:xfrm>
+                <a:off x="9225624" y="508000"/>
+                <a:ext cx="1243482" cy="430887"/>
+              </a:xfrm>
+              <a:prstGeom prst="rect">
+                <a:avLst/>
+              </a:prstGeom>
+              <a:solidFill>
+                <a:schemeClr val="bg1"/>
+              </a:solidFill>
+            </p:spPr>
+            <p:txBody>
+              <a:bodyPr wrap="none" lIns="0" tIns="0" rIns="0" bIns="0" rtlCol="0">
+                <a:spAutoFit/>
+              </a:bodyPr>
+              <a:lstStyle/>
+              <a:p>
+                <a:pPr/>
+                <a14:m>
+                  <m:oMathPara xmlns:m="http://schemas.openxmlformats.org/officeDocument/2006/math">
+                    <m:oMathParaPr>
+                      <m:jc m:val="centerGroup"/>
+                    </m:oMathParaPr>
+                    <m:oMath xmlns:m="http://schemas.openxmlformats.org/officeDocument/2006/math">
+                      <m:r>
+                        <a:rPr lang="en-US" sz="2800" b="0" i="1" smtClean="0">
+                          <a:latin typeface="Cambria Math" panose="02040503050406030204" pitchFamily="18" charset="0"/>
+                        </a:rPr>
+                        <m:t>(</m:t>
+                      </m:r>
+                      <m:sSub>
+                        <m:sSubPr>
+                          <m:ctrlPr>
+                            <a:rPr lang="en-US" sz="2800" i="1" smtClean="0">
+                              <a:latin typeface="Cambria Math" panose="02040503050406030204" pitchFamily="18" charset="0"/>
+                            </a:rPr>
+                          </m:ctrlPr>
+                        </m:sSubPr>
+                        <m:e>
+                          <m:r>
+                            <a:rPr lang="en-US" sz="2800" b="0" i="1" smtClean="0">
+                              <a:latin typeface="Cambria Math" panose="02040503050406030204" pitchFamily="18" charset="0"/>
+                            </a:rPr>
+                            <m:t>𝑞</m:t>
+                          </m:r>
+                        </m:e>
+                        <m:sub>
+                          <m:r>
+                            <a:rPr lang="en-US" sz="2800" b="0" i="1" smtClean="0">
+                              <a:latin typeface="Cambria Math" panose="02040503050406030204" pitchFamily="18" charset="0"/>
+                            </a:rPr>
+                            <m:t>0</m:t>
+                          </m:r>
+                        </m:sub>
+                      </m:sSub>
+                      <m:r>
+                        <a:rPr lang="en-US" sz="2800" b="0" i="1" smtClean="0">
+                          <a:latin typeface="Cambria Math" panose="02040503050406030204" pitchFamily="18" charset="0"/>
+                        </a:rPr>
+                        <m:t>,</m:t>
+                      </m:r>
+                      <m:sSub>
+                        <m:sSubPr>
+                          <m:ctrlPr>
+                            <a:rPr lang="en-US" sz="2800" i="1" smtClean="0">
+                              <a:latin typeface="Cambria Math" panose="02040503050406030204" pitchFamily="18" charset="0"/>
+                            </a:rPr>
+                          </m:ctrlPr>
+                        </m:sSubPr>
+                        <m:e>
+                          <m:r>
+                            <a:rPr lang="en-US" sz="2800" b="0" i="1" smtClean="0">
+                              <a:latin typeface="Cambria Math" panose="02040503050406030204" pitchFamily="18" charset="0"/>
+                            </a:rPr>
+                            <m:t>𝑞</m:t>
+                          </m:r>
+                        </m:e>
+                        <m:sub>
+                          <m:r>
+                            <a:rPr lang="en-US" sz="2800" b="0" i="1" smtClean="0">
+                              <a:latin typeface="Cambria Math" panose="02040503050406030204" pitchFamily="18" charset="0"/>
+                            </a:rPr>
+                            <m:t>𝑖</m:t>
+                          </m:r>
+                        </m:sub>
+                      </m:sSub>
+                      <m:r>
+                        <a:rPr lang="en-US" sz="2800" b="0" i="1" smtClean="0">
+                          <a:latin typeface="Cambria Math" panose="02040503050406030204" pitchFamily="18" charset="0"/>
+                        </a:rPr>
+                        <m:t>),</m:t>
+                      </m:r>
+                    </m:oMath>
+                  </m:oMathPara>
+                </a14:m>
+                <a:endParaRPr lang="en-US" sz="2800" dirty="0"/>
+              </a:p>
+            </p:txBody>
+          </p:sp>
+        </mc:Choice>
+        <mc:Fallback xmlns="">
+          <p:sp>
+            <p:nvSpPr>
+              <p:cNvPr id="4" name="TextBox 3">
+                <a:extLst>
+                  <a:ext uri="{FF2B5EF4-FFF2-40B4-BE49-F238E27FC236}">
+                    <a16:creationId xmlns:a16="http://schemas.microsoft.com/office/drawing/2014/main" id="{B72A3820-4352-C50E-811F-69069EDC475F}"/>
+                  </a:ext>
+                </a:extLst>
+              </p:cNvPr>
+              <p:cNvSpPr txBox="1">
+                <a:spLocks noRot="1" noChangeAspect="1" noMove="1" noResize="1" noEditPoints="1" noAdjustHandles="1" noChangeArrowheads="1" noChangeShapeType="1" noTextEdit="1"/>
+              </p:cNvSpPr>
+              <p:nvPr/>
+            </p:nvSpPr>
+            <p:spPr>
+              <a:xfrm>
+                <a:off x="9225624" y="508000"/>
+                <a:ext cx="1243482" cy="430887"/>
+              </a:xfrm>
+              <a:prstGeom prst="rect">
+                <a:avLst/>
+              </a:prstGeom>
+              <a:blipFill>
+                <a:blip r:embed="rId4"/>
+                <a:stretch>
+                  <a:fillRect/>
+                </a:stretch>
+              </a:blipFill>
+            </p:spPr>
+            <p:txBody>
+              <a:bodyPr/>
+              <a:lstStyle/>
+              <a:p>
+                <a:r>
+                  <a:rPr lang="en-US">
+                    <a:noFill/>
+                  </a:rPr>
+                  <a:t> </a:t>
+                </a:r>
+              </a:p>
+            </p:txBody>
+          </p:sp>
+        </mc:Fallback>
+      </mc:AlternateContent>
+      <mc:AlternateContent xmlns:mc="http://schemas.openxmlformats.org/markup-compatibility/2006" xmlns:a14="http://schemas.microsoft.com/office/drawing/2010/main">
+        <mc:Choice Requires="a14">
+          <p:sp>
+            <p:nvSpPr>
+              <p:cNvPr id="6" name="TextBox 5">
+                <a:extLst>
+                  <a:ext uri="{FF2B5EF4-FFF2-40B4-BE49-F238E27FC236}">
+                    <a16:creationId xmlns:a16="http://schemas.microsoft.com/office/drawing/2014/main" id="{BDA84DD8-5A76-D031-EE08-2A86FB9F184A}"/>
+                  </a:ext>
+                </a:extLst>
+              </p:cNvPr>
+              <p:cNvSpPr txBox="1"/>
+              <p:nvPr/>
+            </p:nvSpPr>
+            <p:spPr>
+              <a:xfrm>
+                <a:off x="5203957" y="4258733"/>
+                <a:ext cx="1778885" cy="430887"/>
+              </a:xfrm>
+              <a:prstGeom prst="rect">
+                <a:avLst/>
+              </a:prstGeom>
+              <a:solidFill>
+                <a:schemeClr val="bg1"/>
+              </a:solidFill>
+            </p:spPr>
+            <p:txBody>
+              <a:bodyPr wrap="none" lIns="0" tIns="0" rIns="0" bIns="0" rtlCol="0">
+                <a:spAutoFit/>
+              </a:bodyPr>
+              <a:lstStyle/>
+              <a:p>
+                <a:pPr/>
+                <a14:m>
+                  <m:oMathPara xmlns:m="http://schemas.openxmlformats.org/officeDocument/2006/math">
+                    <m:oMathParaPr>
+                      <m:jc m:val="centerGroup"/>
+                    </m:oMathParaPr>
+                    <m:oMath xmlns:m="http://schemas.openxmlformats.org/officeDocument/2006/math">
+                      <m:r>
+                        <a:rPr lang="en-US" sz="2800" b="0" i="1" smtClean="0">
+                          <a:latin typeface="Cambria Math" panose="02040503050406030204" pitchFamily="18" charset="0"/>
+                        </a:rPr>
+                        <m:t>(−</m:t>
+                      </m:r>
+                      <m:sSub>
+                        <m:sSubPr>
+                          <m:ctrlPr>
+                            <a:rPr lang="en-US" sz="2800" i="1" smtClean="0">
+                              <a:latin typeface="Cambria Math" panose="02040503050406030204" pitchFamily="18" charset="0"/>
+                            </a:rPr>
+                          </m:ctrlPr>
+                        </m:sSubPr>
+                        <m:e>
+                          <m:r>
+                            <a:rPr lang="en-US" sz="2800" b="0" i="1" smtClean="0">
+                              <a:latin typeface="Cambria Math" panose="02040503050406030204" pitchFamily="18" charset="0"/>
+                            </a:rPr>
+                            <m:t>𝑞</m:t>
+                          </m:r>
+                        </m:e>
+                        <m:sub>
+                          <m:r>
+                            <a:rPr lang="en-US" sz="2800" b="0" i="1" smtClean="0">
+                              <a:latin typeface="Cambria Math" panose="02040503050406030204" pitchFamily="18" charset="0"/>
+                            </a:rPr>
+                            <m:t>0</m:t>
+                          </m:r>
+                        </m:sub>
+                      </m:sSub>
+                      <m:r>
+                        <a:rPr lang="en-US" sz="2800" b="0" i="1" smtClean="0">
+                          <a:latin typeface="Cambria Math" panose="02040503050406030204" pitchFamily="18" charset="0"/>
+                        </a:rPr>
+                        <m:t>,−</m:t>
+                      </m:r>
+                      <m:sSub>
+                        <m:sSubPr>
+                          <m:ctrlPr>
+                            <a:rPr lang="en-US" sz="2800" i="1" smtClean="0">
+                              <a:latin typeface="Cambria Math" panose="02040503050406030204" pitchFamily="18" charset="0"/>
+                            </a:rPr>
+                          </m:ctrlPr>
+                        </m:sSubPr>
+                        <m:e>
+                          <m:r>
+                            <a:rPr lang="en-US" sz="2800" b="0" i="1" smtClean="0">
+                              <a:latin typeface="Cambria Math" panose="02040503050406030204" pitchFamily="18" charset="0"/>
+                            </a:rPr>
+                            <m:t>𝑞</m:t>
+                          </m:r>
+                        </m:e>
+                        <m:sub>
+                          <m:r>
+                            <a:rPr lang="en-US" sz="2800" b="0" i="1" smtClean="0">
+                              <a:latin typeface="Cambria Math" panose="02040503050406030204" pitchFamily="18" charset="0"/>
+                            </a:rPr>
+                            <m:t>𝑖</m:t>
+                          </m:r>
+                        </m:sub>
+                      </m:sSub>
+                      <m:r>
+                        <a:rPr lang="en-US" sz="2800" b="0" i="1" smtClean="0">
+                          <a:latin typeface="Cambria Math" panose="02040503050406030204" pitchFamily="18" charset="0"/>
+                        </a:rPr>
+                        <m:t>),</m:t>
+                      </m:r>
+                    </m:oMath>
+                  </m:oMathPara>
+                </a14:m>
+                <a:endParaRPr lang="en-US" sz="2800" dirty="0"/>
+              </a:p>
+            </p:txBody>
+          </p:sp>
+        </mc:Choice>
+        <mc:Fallback xmlns="">
+          <p:sp>
+            <p:nvSpPr>
+              <p:cNvPr id="6" name="TextBox 5">
+                <a:extLst>
+                  <a:ext uri="{FF2B5EF4-FFF2-40B4-BE49-F238E27FC236}">
+                    <a16:creationId xmlns:a16="http://schemas.microsoft.com/office/drawing/2014/main" id="{BDA84DD8-5A76-D031-EE08-2A86FB9F184A}"/>
+                  </a:ext>
+                </a:extLst>
+              </p:cNvPr>
+              <p:cNvSpPr txBox="1">
+                <a:spLocks noRot="1" noChangeAspect="1" noMove="1" noResize="1" noEditPoints="1" noAdjustHandles="1" noChangeArrowheads="1" noChangeShapeType="1" noTextEdit="1"/>
+              </p:cNvSpPr>
+              <p:nvPr/>
+            </p:nvSpPr>
+            <p:spPr>
+              <a:xfrm>
+                <a:off x="5203957" y="4258733"/>
+                <a:ext cx="1778885" cy="430887"/>
+              </a:xfrm>
+              <a:prstGeom prst="rect">
+                <a:avLst/>
+              </a:prstGeom>
+              <a:blipFill>
+                <a:blip r:embed="rId5"/>
+                <a:stretch>
+                  <a:fillRect/>
+                </a:stretch>
+              </a:blipFill>
+            </p:spPr>
+            <p:txBody>
+              <a:bodyPr/>
+              <a:lstStyle/>
+              <a:p>
+                <a:r>
+                  <a:rPr lang="en-US">
+                    <a:noFill/>
+                  </a:rPr>
+                  <a:t> </a:t>
+                </a:r>
+              </a:p>
+            </p:txBody>
+          </p:sp>
+        </mc:Fallback>
+      </mc:AlternateContent>
+      <mc:AlternateContent xmlns:mc="http://schemas.openxmlformats.org/markup-compatibility/2006" xmlns:a14="http://schemas.microsoft.com/office/drawing/2010/main">
+        <mc:Choice Requires="a14">
+          <p:sp>
+            <p:nvSpPr>
+              <p:cNvPr id="7" name="TextBox 6">
+                <a:extLst>
+                  <a:ext uri="{FF2B5EF4-FFF2-40B4-BE49-F238E27FC236}">
+                    <a16:creationId xmlns:a16="http://schemas.microsoft.com/office/drawing/2014/main" id="{B9433176-23E4-C5B5-3F1F-003861C5305F}"/>
+                  </a:ext>
+                </a:extLst>
+              </p:cNvPr>
+              <p:cNvSpPr txBox="1"/>
+              <p:nvPr/>
+            </p:nvSpPr>
+            <p:spPr>
+              <a:xfrm>
+                <a:off x="7600024" y="0"/>
+                <a:ext cx="383888" cy="430887"/>
+              </a:xfrm>
+              <a:prstGeom prst="rect">
+                <a:avLst/>
+              </a:prstGeom>
+              <a:solidFill>
+                <a:schemeClr val="bg1"/>
+              </a:solidFill>
+            </p:spPr>
+            <p:txBody>
+              <a:bodyPr wrap="none" lIns="0" tIns="0" rIns="0" bIns="0" rtlCol="0">
+                <a:spAutoFit/>
+              </a:bodyPr>
+              <a:lstStyle/>
+              <a:p>
+                <a:pPr/>
+                <a14:m>
+                  <m:oMathPara xmlns:m="http://schemas.openxmlformats.org/officeDocument/2006/math">
+                    <m:oMathParaPr>
+                      <m:jc m:val="centerGroup"/>
+                    </m:oMathParaPr>
+                    <m:oMath xmlns:m="http://schemas.openxmlformats.org/officeDocument/2006/math">
+                      <m:sSub>
+                        <m:sSubPr>
+                          <m:ctrlPr>
+                            <a:rPr lang="en-US" sz="2800" i="1" smtClean="0">
+                              <a:latin typeface="Cambria Math" panose="02040503050406030204" pitchFamily="18" charset="0"/>
+                            </a:rPr>
+                          </m:ctrlPr>
+                        </m:sSubPr>
+                        <m:e>
+                          <m:r>
+                            <a:rPr lang="en-US" sz="2800" b="0" i="1" smtClean="0">
+                              <a:latin typeface="Cambria Math" panose="02040503050406030204" pitchFamily="18" charset="0"/>
+                            </a:rPr>
+                            <m:t>𝑞</m:t>
+                          </m:r>
+                        </m:e>
+                        <m:sub>
+                          <m:r>
+                            <a:rPr lang="en-US" sz="2800" b="0" i="1" smtClean="0">
+                              <a:latin typeface="Cambria Math" panose="02040503050406030204" pitchFamily="18" charset="0"/>
+                            </a:rPr>
+                            <m:t>𝑖</m:t>
+                          </m:r>
+                        </m:sub>
+                      </m:sSub>
+                    </m:oMath>
+                  </m:oMathPara>
+                </a14:m>
+                <a:endParaRPr lang="en-US" sz="2800" dirty="0"/>
+              </a:p>
+            </p:txBody>
+          </p:sp>
+        </mc:Choice>
+        <mc:Fallback xmlns="">
+          <p:sp>
+            <p:nvSpPr>
+              <p:cNvPr id="7" name="TextBox 6">
+                <a:extLst>
+                  <a:ext uri="{FF2B5EF4-FFF2-40B4-BE49-F238E27FC236}">
+                    <a16:creationId xmlns:a16="http://schemas.microsoft.com/office/drawing/2014/main" id="{B9433176-23E4-C5B5-3F1F-003861C5305F}"/>
+                  </a:ext>
+                </a:extLst>
+              </p:cNvPr>
+              <p:cNvSpPr txBox="1">
+                <a:spLocks noRot="1" noChangeAspect="1" noMove="1" noResize="1" noEditPoints="1" noAdjustHandles="1" noChangeArrowheads="1" noChangeShapeType="1" noTextEdit="1"/>
+              </p:cNvSpPr>
+              <p:nvPr/>
+            </p:nvSpPr>
+            <p:spPr>
+              <a:xfrm>
+                <a:off x="7600024" y="0"/>
+                <a:ext cx="383888" cy="430887"/>
+              </a:xfrm>
+              <a:prstGeom prst="rect">
+                <a:avLst/>
+              </a:prstGeom>
+              <a:blipFill>
+                <a:blip r:embed="rId6"/>
+                <a:stretch>
+                  <a:fillRect/>
+                </a:stretch>
+              </a:blipFill>
+            </p:spPr>
+            <p:txBody>
+              <a:bodyPr/>
+              <a:lstStyle/>
+              <a:p>
+                <a:r>
+                  <a:rPr lang="en-US">
+                    <a:noFill/>
+                  </a:rPr>
+                  <a:t> </a:t>
+                </a:r>
+              </a:p>
+            </p:txBody>
+          </p:sp>
+        </mc:Fallback>
+      </mc:AlternateContent>
+      <mc:AlternateContent xmlns:mc="http://schemas.openxmlformats.org/markup-compatibility/2006" xmlns:a14="http://schemas.microsoft.com/office/drawing/2010/main">
+        <mc:Choice Requires="a14">
+          <p:sp>
+            <p:nvSpPr>
+              <p:cNvPr id="8" name="TextBox 7">
+                <a:extLst>
+                  <a:ext uri="{FF2B5EF4-FFF2-40B4-BE49-F238E27FC236}">
+                    <a16:creationId xmlns:a16="http://schemas.microsoft.com/office/drawing/2014/main" id="{1180EB47-9E71-5495-23D8-895BA6BF5E30}"/>
+                  </a:ext>
+                </a:extLst>
+              </p:cNvPr>
+              <p:cNvSpPr txBox="1"/>
+              <p:nvPr/>
+            </p:nvSpPr>
+            <p:spPr>
+              <a:xfrm>
+                <a:off x="10686124" y="2771559"/>
+                <a:ext cx="435889" cy="430887"/>
+              </a:xfrm>
+              <a:prstGeom prst="rect">
+                <a:avLst/>
+              </a:prstGeom>
+              <a:solidFill>
+                <a:schemeClr val="bg1"/>
+              </a:solidFill>
+            </p:spPr>
+            <p:txBody>
+              <a:bodyPr wrap="none" lIns="0" tIns="0" rIns="0" bIns="0" rtlCol="0">
+                <a:spAutoFit/>
+              </a:bodyPr>
+              <a:lstStyle/>
+              <a:p>
+                <a:pPr/>
+                <a14:m>
+                  <m:oMathPara xmlns:m="http://schemas.openxmlformats.org/officeDocument/2006/math">
+                    <m:oMathParaPr>
+                      <m:jc m:val="centerGroup"/>
+                    </m:oMathParaPr>
+                    <m:oMath xmlns:m="http://schemas.openxmlformats.org/officeDocument/2006/math">
+                      <m:sSub>
+                        <m:sSubPr>
+                          <m:ctrlPr>
+                            <a:rPr lang="en-US" sz="2800" i="1" smtClean="0">
+                              <a:latin typeface="Cambria Math" panose="02040503050406030204" pitchFamily="18" charset="0"/>
+                            </a:rPr>
+                          </m:ctrlPr>
+                        </m:sSubPr>
+                        <m:e>
+                          <m:r>
+                            <a:rPr lang="en-US" sz="2800" b="0" i="1" smtClean="0">
+                              <a:latin typeface="Cambria Math" panose="02040503050406030204" pitchFamily="18" charset="0"/>
+                            </a:rPr>
+                            <m:t>𝑞</m:t>
+                          </m:r>
+                        </m:e>
+                        <m:sub>
+                          <m:r>
+                            <a:rPr lang="en-US" sz="2800" b="0" i="1" smtClean="0">
+                              <a:latin typeface="Cambria Math" panose="02040503050406030204" pitchFamily="18" charset="0"/>
+                            </a:rPr>
+                            <m:t>0</m:t>
+                          </m:r>
+                        </m:sub>
+                      </m:sSub>
+                    </m:oMath>
+                  </m:oMathPara>
+                </a14:m>
+                <a:endParaRPr lang="en-US" sz="2800" dirty="0"/>
+              </a:p>
+            </p:txBody>
+          </p:sp>
+        </mc:Choice>
+        <mc:Fallback xmlns="">
+          <p:sp>
+            <p:nvSpPr>
+              <p:cNvPr id="8" name="TextBox 7">
+                <a:extLst>
+                  <a:ext uri="{FF2B5EF4-FFF2-40B4-BE49-F238E27FC236}">
+                    <a16:creationId xmlns:a16="http://schemas.microsoft.com/office/drawing/2014/main" id="{1180EB47-9E71-5495-23D8-895BA6BF5E30}"/>
+                  </a:ext>
+                </a:extLst>
+              </p:cNvPr>
+              <p:cNvSpPr txBox="1">
+                <a:spLocks noRot="1" noChangeAspect="1" noMove="1" noResize="1" noEditPoints="1" noAdjustHandles="1" noChangeArrowheads="1" noChangeShapeType="1" noTextEdit="1"/>
+              </p:cNvSpPr>
+              <p:nvPr/>
+            </p:nvSpPr>
+            <p:spPr>
+              <a:xfrm>
+                <a:off x="10686124" y="2771559"/>
+                <a:ext cx="435889" cy="430887"/>
+              </a:xfrm>
+              <a:prstGeom prst="rect">
+                <a:avLst/>
+              </a:prstGeom>
+              <a:blipFill>
+                <a:blip r:embed="rId7"/>
+                <a:stretch>
+                  <a:fillRect/>
+                </a:stretch>
+              </a:blipFill>
+            </p:spPr>
+            <p:txBody>
+              <a:bodyPr/>
+              <a:lstStyle/>
+              <a:p>
+                <a:r>
+                  <a:rPr lang="en-US">
+                    <a:noFill/>
+                  </a:rPr>
+                  <a:t> </a:t>
+                </a:r>
+              </a:p>
+            </p:txBody>
+          </p:sp>
+        </mc:Fallback>
+      </mc:AlternateContent>
     </p:spTree>
     <p:extLst>
       <p:ext uri="{BB962C8B-B14F-4D97-AF65-F5344CB8AC3E}">
         <p14:creationId xmlns:p14="http://schemas.microsoft.com/office/powerpoint/2010/main" val="1535702644"/>
+      </p:ext>
+    </p:extLst>
+  </p:cSld>
+  <p:clrMapOvr>
+    <a:masterClrMapping/>
+  </p:clrMapOvr>
+</p:sld>
+</file>
+
+<file path=ppt/slides/slide13.xml><?xml version="1.0" encoding="utf-8"?>
+<p:sld xmlns:a="http://schemas.openxmlformats.org/drawingml/2006/main" xmlns:r="http://schemas.openxmlformats.org/officeDocument/2006/relationships" xmlns:p="http://schemas.openxmlformats.org/presentationml/2006/main">
+  <p:cSld>
+    <p:spTree>
+      <p:nvGrpSpPr>
+        <p:cNvPr id="1" name=""/>
+        <p:cNvGrpSpPr/>
+        <p:nvPr/>
+      </p:nvGrpSpPr>
+      <p:grpSpPr>
+        <a:xfrm>
+          <a:off x="0" y="0"/>
+          <a:ext cx="0" cy="0"/>
+          <a:chOff x="0" y="0"/>
+          <a:chExt cx="0" cy="0"/>
+        </a:xfrm>
+      </p:grpSpPr>
+      <p:pic>
+        <p:nvPicPr>
+          <p:cNvPr id="5" name="Content Placeholder 4">
+            <a:extLst>
+              <a:ext uri="{FF2B5EF4-FFF2-40B4-BE49-F238E27FC236}">
+                <a16:creationId xmlns:a16="http://schemas.microsoft.com/office/drawing/2014/main" id="{98C2F9F5-77CE-0C36-AFE5-CF3C373AC5A4}"/>
+              </a:ext>
+            </a:extLst>
+          </p:cNvPr>
+          <p:cNvPicPr>
+            <a:picLocks noGrp="1" noChangeAspect="1"/>
+          </p:cNvPicPr>
+          <p:nvPr>
+            <p:ph idx="1"/>
+          </p:nvPr>
+        </p:nvPicPr>
+        <p:blipFill rotWithShape="1">
+          <a:blip r:embed="rId2">
+            <a:extLst>
+              <a:ext uri="{28A0092B-C50C-407E-A947-70E740481C1C}">
+                <a14:useLocalDpi xmlns:a14="http://schemas.microsoft.com/office/drawing/2010/main" val="0"/>
+              </a:ext>
+            </a:extLst>
+          </a:blip>
+          <a:srcRect t="8701" b="12551"/>
+          <a:stretch/>
+        </p:blipFill>
+        <p:spPr>
+          <a:xfrm>
+            <a:off x="1950293" y="1867301"/>
+            <a:ext cx="7444390" cy="3426594"/>
+          </a:xfrm>
+        </p:spPr>
+      </p:pic>
+      <mc:AlternateContent xmlns:mc="http://schemas.openxmlformats.org/markup-compatibility/2006" xmlns:a14="http://schemas.microsoft.com/office/drawing/2010/main">
+        <mc:Choice Requires="a14">
+          <p:sp>
+            <p:nvSpPr>
+              <p:cNvPr id="13" name="TextBox 12">
+                <a:extLst>
+                  <a:ext uri="{FF2B5EF4-FFF2-40B4-BE49-F238E27FC236}">
+                    <a16:creationId xmlns:a16="http://schemas.microsoft.com/office/drawing/2014/main" id="{5E2EA7EA-3539-FC6D-955D-4A25D6D22612}"/>
+                  </a:ext>
+                </a:extLst>
+              </p:cNvPr>
+              <p:cNvSpPr txBox="1"/>
+              <p:nvPr/>
+            </p:nvSpPr>
+            <p:spPr>
+              <a:xfrm>
+                <a:off x="2578085" y="3510521"/>
+                <a:ext cx="350481" cy="307777"/>
+              </a:xfrm>
+              <a:prstGeom prst="rect">
+                <a:avLst/>
+              </a:prstGeom>
+              <a:noFill/>
+            </p:spPr>
+            <p:txBody>
+              <a:bodyPr wrap="none" lIns="0" tIns="0" rIns="0" bIns="0" rtlCol="0">
+                <a:spAutoFit/>
+              </a:bodyPr>
+              <a:lstStyle/>
+              <a:p>
+                <a:pPr/>
+                <a14:m>
+                  <m:oMathPara xmlns:m="http://schemas.openxmlformats.org/officeDocument/2006/math">
+                    <m:oMathParaPr>
+                      <m:jc m:val="centerGroup"/>
+                    </m:oMathParaPr>
+                    <m:oMath xmlns:m="http://schemas.openxmlformats.org/officeDocument/2006/math">
+                      <m:sSub>
+                        <m:sSubPr>
+                          <m:ctrlPr>
+                            <a:rPr lang="en-US" sz="2000" b="1" i="1" smtClean="0">
+                              <a:latin typeface="Cambria Math" panose="02040503050406030204" pitchFamily="18" charset="0"/>
+                            </a:rPr>
+                          </m:ctrlPr>
+                        </m:sSubPr>
+                        <m:e>
+                          <m:acc>
+                            <m:accPr>
+                              <m:chr m:val="̂"/>
+                              <m:ctrlPr>
+                                <a:rPr lang="en-US" sz="2000" b="1" i="1">
+                                  <a:latin typeface="Cambria Math" panose="02040503050406030204" pitchFamily="18" charset="0"/>
+                                </a:rPr>
+                              </m:ctrlPr>
+                            </m:accPr>
+                            <m:e>
+                              <m:r>
+                                <a:rPr lang="en-US" sz="2000" b="1" i="1">
+                                  <a:latin typeface="Cambria Math" panose="02040503050406030204" pitchFamily="18" charset="0"/>
+                                </a:rPr>
+                                <m:t>𝒚</m:t>
+                              </m:r>
+                            </m:e>
+                          </m:acc>
+                        </m:e>
+                        <m:sub>
+                          <m:r>
+                            <a:rPr lang="en-US" sz="2000" b="1" i="1" smtClean="0">
+                              <a:latin typeface="Cambria Math" panose="02040503050406030204" pitchFamily="18" charset="0"/>
+                            </a:rPr>
+                            <m:t>𝑷</m:t>
+                          </m:r>
+                        </m:sub>
+                      </m:sSub>
+                    </m:oMath>
+                  </m:oMathPara>
+                </a14:m>
+                <a:endParaRPr lang="en-US" sz="2000" b="1" dirty="0"/>
+              </a:p>
+            </p:txBody>
+          </p:sp>
+        </mc:Choice>
+        <mc:Fallback xmlns="">
+          <p:sp>
+            <p:nvSpPr>
+              <p:cNvPr id="13" name="TextBox 12">
+                <a:extLst>
+                  <a:ext uri="{FF2B5EF4-FFF2-40B4-BE49-F238E27FC236}">
+                    <a16:creationId xmlns:a16="http://schemas.microsoft.com/office/drawing/2014/main" id="{5E2EA7EA-3539-FC6D-955D-4A25D6D22612}"/>
+                  </a:ext>
+                </a:extLst>
+              </p:cNvPr>
+              <p:cNvSpPr txBox="1">
+                <a:spLocks noRot="1" noChangeAspect="1" noMove="1" noResize="1" noEditPoints="1" noAdjustHandles="1" noChangeArrowheads="1" noChangeShapeType="1" noTextEdit="1"/>
+              </p:cNvSpPr>
+              <p:nvPr/>
+            </p:nvSpPr>
+            <p:spPr>
+              <a:xfrm>
+                <a:off x="2578085" y="3510521"/>
+                <a:ext cx="350481" cy="307777"/>
+              </a:xfrm>
+              <a:prstGeom prst="rect">
+                <a:avLst/>
+              </a:prstGeom>
+              <a:blipFill>
+                <a:blip r:embed="rId3"/>
+                <a:stretch>
+                  <a:fillRect l="-21053" t="-26000" r="-36842" b="-26000"/>
+                </a:stretch>
+              </a:blipFill>
+            </p:spPr>
+            <p:txBody>
+              <a:bodyPr/>
+              <a:lstStyle/>
+              <a:p>
+                <a:r>
+                  <a:rPr lang="en-US">
+                    <a:noFill/>
+                  </a:rPr>
+                  <a:t> </a:t>
+                </a:r>
+              </a:p>
+            </p:txBody>
+          </p:sp>
+        </mc:Fallback>
+      </mc:AlternateContent>
+      <mc:AlternateContent xmlns:mc="http://schemas.openxmlformats.org/markup-compatibility/2006" xmlns:a14="http://schemas.microsoft.com/office/drawing/2010/main">
+        <mc:Choice Requires="a14">
+          <p:sp>
+            <p:nvSpPr>
+              <p:cNvPr id="16" name="TextBox 15">
+                <a:extLst>
+                  <a:ext uri="{FF2B5EF4-FFF2-40B4-BE49-F238E27FC236}">
+                    <a16:creationId xmlns:a16="http://schemas.microsoft.com/office/drawing/2014/main" id="{E8252E12-6E4C-3C1D-D4D7-9738513DD787}"/>
+                  </a:ext>
+                </a:extLst>
+              </p:cNvPr>
+              <p:cNvSpPr txBox="1"/>
+              <p:nvPr/>
+            </p:nvSpPr>
+            <p:spPr>
+              <a:xfrm>
+                <a:off x="5948943" y="2505300"/>
+                <a:ext cx="344069" cy="307777"/>
+              </a:xfrm>
+              <a:prstGeom prst="rect">
+                <a:avLst/>
+              </a:prstGeom>
+              <a:noFill/>
+            </p:spPr>
+            <p:txBody>
+              <a:bodyPr wrap="none" lIns="0" tIns="0" rIns="0" bIns="0" rtlCol="0">
+                <a:spAutoFit/>
+              </a:bodyPr>
+              <a:lstStyle/>
+              <a:p>
+                <a:pPr/>
+                <a14:m>
+                  <m:oMathPara xmlns:m="http://schemas.openxmlformats.org/officeDocument/2006/math">
+                    <m:oMathParaPr>
+                      <m:jc m:val="centerGroup"/>
+                    </m:oMathParaPr>
+                    <m:oMath xmlns:m="http://schemas.openxmlformats.org/officeDocument/2006/math">
+                      <m:sSub>
+                        <m:sSubPr>
+                          <m:ctrlPr>
+                            <a:rPr lang="en-US" sz="2000" b="1" i="1" smtClean="0">
+                              <a:latin typeface="Cambria Math" panose="02040503050406030204" pitchFamily="18" charset="0"/>
+                            </a:rPr>
+                          </m:ctrlPr>
+                        </m:sSubPr>
+                        <m:e>
+                          <m:acc>
+                            <m:accPr>
+                              <m:chr m:val="̂"/>
+                              <m:ctrlPr>
+                                <a:rPr lang="en-US" sz="2000" b="1" i="1">
+                                  <a:latin typeface="Cambria Math" panose="02040503050406030204" pitchFamily="18" charset="0"/>
+                                </a:rPr>
+                              </m:ctrlPr>
+                            </m:accPr>
+                            <m:e>
+                              <m:r>
+                                <a:rPr lang="en-US" sz="2000" b="1" i="1" smtClean="0">
+                                  <a:latin typeface="Cambria Math" panose="02040503050406030204" pitchFamily="18" charset="0"/>
+                                </a:rPr>
+                                <m:t>𝒙</m:t>
+                              </m:r>
+                            </m:e>
+                          </m:acc>
+                        </m:e>
+                        <m:sub>
+                          <m:r>
+                            <a:rPr lang="en-US" sz="2000" b="1" i="1" smtClean="0">
+                              <a:latin typeface="Cambria Math" panose="02040503050406030204" pitchFamily="18" charset="0"/>
+                            </a:rPr>
+                            <m:t>𝑷</m:t>
+                          </m:r>
+                        </m:sub>
+                      </m:sSub>
+                    </m:oMath>
+                  </m:oMathPara>
+                </a14:m>
+                <a:endParaRPr lang="en-US" sz="2000" b="1" dirty="0"/>
+              </a:p>
+            </p:txBody>
+          </p:sp>
+        </mc:Choice>
+        <mc:Fallback xmlns="">
+          <p:sp>
+            <p:nvSpPr>
+              <p:cNvPr id="16" name="TextBox 15">
+                <a:extLst>
+                  <a:ext uri="{FF2B5EF4-FFF2-40B4-BE49-F238E27FC236}">
+                    <a16:creationId xmlns:a16="http://schemas.microsoft.com/office/drawing/2014/main" id="{E8252E12-6E4C-3C1D-D4D7-9738513DD787}"/>
+                  </a:ext>
+                </a:extLst>
+              </p:cNvPr>
+              <p:cNvSpPr txBox="1">
+                <a:spLocks noRot="1" noChangeAspect="1" noMove="1" noResize="1" noEditPoints="1" noAdjustHandles="1" noChangeArrowheads="1" noChangeShapeType="1" noTextEdit="1"/>
+              </p:cNvSpPr>
+              <p:nvPr/>
+            </p:nvSpPr>
+            <p:spPr>
+              <a:xfrm>
+                <a:off x="5948943" y="2505300"/>
+                <a:ext cx="344069" cy="307777"/>
+              </a:xfrm>
+              <a:prstGeom prst="rect">
+                <a:avLst/>
+              </a:prstGeom>
+              <a:blipFill>
+                <a:blip r:embed="rId4"/>
+                <a:stretch>
+                  <a:fillRect l="-21429" t="-26000" r="-37500" b="-18000"/>
+                </a:stretch>
+              </a:blipFill>
+            </p:spPr>
+            <p:txBody>
+              <a:bodyPr/>
+              <a:lstStyle/>
+              <a:p>
+                <a:r>
+                  <a:rPr lang="en-US">
+                    <a:noFill/>
+                  </a:rPr>
+                  <a:t> </a:t>
+                </a:r>
+              </a:p>
+            </p:txBody>
+          </p:sp>
+        </mc:Fallback>
+      </mc:AlternateContent>
+      <mc:AlternateContent xmlns:mc="http://schemas.openxmlformats.org/markup-compatibility/2006" xmlns:a14="http://schemas.microsoft.com/office/drawing/2010/main">
+        <mc:Choice Requires="a14">
+          <p:sp>
+            <p:nvSpPr>
+              <p:cNvPr id="17" name="TextBox 16">
+                <a:extLst>
+                  <a:ext uri="{FF2B5EF4-FFF2-40B4-BE49-F238E27FC236}">
+                    <a16:creationId xmlns:a16="http://schemas.microsoft.com/office/drawing/2014/main" id="{95BC70C0-7DA5-B976-7568-4B21D6BC86A2}"/>
+                  </a:ext>
+                </a:extLst>
+              </p:cNvPr>
+              <p:cNvSpPr txBox="1"/>
+              <p:nvPr/>
+            </p:nvSpPr>
+            <p:spPr>
+              <a:xfrm>
+                <a:off x="2859997" y="4454376"/>
+                <a:ext cx="329641" cy="307777"/>
+              </a:xfrm>
+              <a:prstGeom prst="rect">
+                <a:avLst/>
+              </a:prstGeom>
+              <a:noFill/>
+            </p:spPr>
+            <p:txBody>
+              <a:bodyPr wrap="none" lIns="0" tIns="0" rIns="0" bIns="0" rtlCol="0">
+                <a:spAutoFit/>
+              </a:bodyPr>
+              <a:lstStyle/>
+              <a:p>
+                <a:pPr/>
+                <a14:m>
+                  <m:oMathPara xmlns:m="http://schemas.openxmlformats.org/officeDocument/2006/math">
+                    <m:oMathParaPr>
+                      <m:jc m:val="centerGroup"/>
+                    </m:oMathParaPr>
+                    <m:oMath xmlns:m="http://schemas.openxmlformats.org/officeDocument/2006/math">
+                      <m:sSub>
+                        <m:sSubPr>
+                          <m:ctrlPr>
+                            <a:rPr lang="en-US" sz="2000" b="1" i="1" smtClean="0">
+                              <a:latin typeface="Cambria Math" panose="02040503050406030204" pitchFamily="18" charset="0"/>
+                            </a:rPr>
+                          </m:ctrlPr>
+                        </m:sSubPr>
+                        <m:e>
+                          <m:acc>
+                            <m:accPr>
+                              <m:chr m:val="̂"/>
+                              <m:ctrlPr>
+                                <a:rPr lang="en-US" sz="2000" b="1" i="1">
+                                  <a:latin typeface="Cambria Math" panose="02040503050406030204" pitchFamily="18" charset="0"/>
+                                </a:rPr>
+                              </m:ctrlPr>
+                            </m:accPr>
+                            <m:e>
+                              <m:r>
+                                <a:rPr lang="en-US" sz="2000" b="1" i="1" smtClean="0">
+                                  <a:latin typeface="Cambria Math" panose="02040503050406030204" pitchFamily="18" charset="0"/>
+                                </a:rPr>
+                                <m:t>𝒛</m:t>
+                              </m:r>
+                            </m:e>
+                          </m:acc>
+                        </m:e>
+                        <m:sub>
+                          <m:r>
+                            <a:rPr lang="en-US" sz="2000" b="1" i="1" smtClean="0">
+                              <a:latin typeface="Cambria Math" panose="02040503050406030204" pitchFamily="18" charset="0"/>
+                            </a:rPr>
+                            <m:t>𝑷</m:t>
+                          </m:r>
+                        </m:sub>
+                      </m:sSub>
+                    </m:oMath>
+                  </m:oMathPara>
+                </a14:m>
+                <a:endParaRPr lang="en-US" sz="2000" b="1" dirty="0"/>
+              </a:p>
+            </p:txBody>
+          </p:sp>
+        </mc:Choice>
+        <mc:Fallback xmlns="">
+          <p:sp>
+            <p:nvSpPr>
+              <p:cNvPr id="17" name="TextBox 16">
+                <a:extLst>
+                  <a:ext uri="{FF2B5EF4-FFF2-40B4-BE49-F238E27FC236}">
+                    <a16:creationId xmlns:a16="http://schemas.microsoft.com/office/drawing/2014/main" id="{95BC70C0-7DA5-B976-7568-4B21D6BC86A2}"/>
+                  </a:ext>
+                </a:extLst>
+              </p:cNvPr>
+              <p:cNvSpPr txBox="1">
+                <a:spLocks noRot="1" noChangeAspect="1" noMove="1" noResize="1" noEditPoints="1" noAdjustHandles="1" noChangeArrowheads="1" noChangeShapeType="1" noTextEdit="1"/>
+              </p:cNvSpPr>
+              <p:nvPr/>
+            </p:nvSpPr>
+            <p:spPr>
+              <a:xfrm>
+                <a:off x="2859997" y="4454376"/>
+                <a:ext cx="329641" cy="307777"/>
+              </a:xfrm>
+              <a:prstGeom prst="rect">
+                <a:avLst/>
+              </a:prstGeom>
+              <a:blipFill>
+                <a:blip r:embed="rId5"/>
+                <a:stretch>
+                  <a:fillRect l="-14815" t="-26000" r="-46296" b="-18000"/>
+                </a:stretch>
+              </a:blipFill>
+            </p:spPr>
+            <p:txBody>
+              <a:bodyPr/>
+              <a:lstStyle/>
+              <a:p>
+                <a:r>
+                  <a:rPr lang="en-US">
+                    <a:noFill/>
+                  </a:rPr>
+                  <a:t> </a:t>
+                </a:r>
+              </a:p>
+            </p:txBody>
+          </p:sp>
+        </mc:Fallback>
+      </mc:AlternateContent>
+      <p:cxnSp>
+        <p:nvCxnSpPr>
+          <p:cNvPr id="20" name="Straight Arrow Connector 19">
+            <a:extLst>
+              <a:ext uri="{FF2B5EF4-FFF2-40B4-BE49-F238E27FC236}">
+                <a16:creationId xmlns:a16="http://schemas.microsoft.com/office/drawing/2014/main" id="{23E4642F-1A83-30BE-ADE6-0472861855A6}"/>
+              </a:ext>
+            </a:extLst>
+          </p:cNvPr>
+          <p:cNvCxnSpPr>
+            <a:cxnSpLocks/>
+          </p:cNvCxnSpPr>
+          <p:nvPr/>
+        </p:nvCxnSpPr>
+        <p:spPr>
+          <a:xfrm flipV="1">
+            <a:off x="5867535" y="2570480"/>
+            <a:ext cx="0" cy="1353908"/>
+          </a:xfrm>
+          <a:prstGeom prst="straightConnector1">
+            <a:avLst/>
+          </a:prstGeom>
+          <a:ln w="57150">
+            <a:solidFill>
+              <a:srgbClr val="1122FF"/>
+            </a:solidFill>
+            <a:tailEnd type="triangle"/>
+          </a:ln>
+        </p:spPr>
+        <p:style>
+          <a:lnRef idx="1">
+            <a:schemeClr val="accent1"/>
+          </a:lnRef>
+          <a:fillRef idx="0">
+            <a:schemeClr val="accent1"/>
+          </a:fillRef>
+          <a:effectRef idx="0">
+            <a:schemeClr val="accent1"/>
+          </a:effectRef>
+          <a:fontRef idx="minor">
+            <a:schemeClr val="tx1"/>
+          </a:fontRef>
+        </p:style>
+      </p:cxnSp>
+      <p:grpSp>
+        <p:nvGrpSpPr>
+          <p:cNvPr id="22" name="Group 21">
+            <a:extLst>
+              <a:ext uri="{FF2B5EF4-FFF2-40B4-BE49-F238E27FC236}">
+                <a16:creationId xmlns:a16="http://schemas.microsoft.com/office/drawing/2014/main" id="{3152F512-CC01-5FA7-F3B9-DD640092D73A}"/>
+              </a:ext>
+            </a:extLst>
+          </p:cNvPr>
+          <p:cNvGrpSpPr/>
+          <p:nvPr/>
+        </p:nvGrpSpPr>
+        <p:grpSpPr>
+          <a:xfrm>
+            <a:off x="5720994" y="2975618"/>
+            <a:ext cx="293081" cy="293079"/>
+            <a:chOff x="6096000" y="1864501"/>
+            <a:chExt cx="343816" cy="343814"/>
+          </a:xfrm>
+        </p:grpSpPr>
+        <p:sp>
+          <p:nvSpPr>
+            <p:cNvPr id="23" name="Oval 22">
+              <a:extLst>
+                <a:ext uri="{FF2B5EF4-FFF2-40B4-BE49-F238E27FC236}">
+                  <a16:creationId xmlns:a16="http://schemas.microsoft.com/office/drawing/2014/main" id="{8134E106-27C1-B1F8-DA12-A3A6527C3FB2}"/>
+                </a:ext>
+              </a:extLst>
+            </p:cNvPr>
+            <p:cNvSpPr/>
+            <p:nvPr/>
+          </p:nvSpPr>
+          <p:spPr>
+            <a:xfrm>
+              <a:off x="6112893" y="1881384"/>
+              <a:ext cx="310049" cy="310049"/>
+            </a:xfrm>
+            <a:prstGeom prst="ellipse">
+              <a:avLst/>
+            </a:prstGeom>
+            <a:solidFill>
+              <a:srgbClr val="00B050"/>
+            </a:solidFill>
+            <a:ln w="28575">
+              <a:noFill/>
+            </a:ln>
+          </p:spPr>
+          <p:style>
+            <a:lnRef idx="2">
+              <a:schemeClr val="accent1">
+                <a:shade val="15000"/>
+              </a:schemeClr>
+            </a:lnRef>
+            <a:fillRef idx="1">
+              <a:schemeClr val="accent1"/>
+            </a:fillRef>
+            <a:effectRef idx="0">
+              <a:schemeClr val="accent1"/>
+            </a:effectRef>
+            <a:fontRef idx="minor">
+              <a:schemeClr val="lt1"/>
+            </a:fontRef>
+          </p:style>
+          <p:txBody>
+            <a:bodyPr rtlCol="0" anchor="ctr"/>
+            <a:lstStyle/>
+            <a:p>
+              <a:pPr algn="ctr"/>
+              <a:endParaRPr lang="en-US"/>
+            </a:p>
+          </p:txBody>
+        </p:sp>
+        <p:pic>
+          <p:nvPicPr>
+            <p:cNvPr id="24" name="Picture 23">
+              <a:extLst>
+                <a:ext uri="{FF2B5EF4-FFF2-40B4-BE49-F238E27FC236}">
+                  <a16:creationId xmlns:a16="http://schemas.microsoft.com/office/drawing/2014/main" id="{F21FC761-D871-6037-7DD9-BAFE7588888C}"/>
+                </a:ext>
+              </a:extLst>
+            </p:cNvPr>
+            <p:cNvPicPr>
+              <a:picLocks noChangeAspect="1"/>
+            </p:cNvPicPr>
+            <p:nvPr/>
+          </p:nvPicPr>
+          <p:blipFill>
+            <a:blip r:embed="rId6">
+              <a:extLst>
+                <a:ext uri="{28A0092B-C50C-407E-A947-70E740481C1C}">
+                  <a14:useLocalDpi xmlns:a14="http://schemas.microsoft.com/office/drawing/2010/main" val="0"/>
+                </a:ext>
+              </a:extLst>
+            </a:blip>
+            <a:stretch>
+              <a:fillRect/>
+            </a:stretch>
+          </p:blipFill>
+          <p:spPr>
+            <a:xfrm>
+              <a:off x="6096000" y="1864501"/>
+              <a:ext cx="343816" cy="343814"/>
+            </a:xfrm>
+            <a:prstGeom prst="rect">
+              <a:avLst/>
+            </a:prstGeom>
+            <a:ln>
+              <a:noFill/>
+            </a:ln>
+          </p:spPr>
+        </p:pic>
+      </p:grpSp>
+      <p:sp>
+        <p:nvSpPr>
+          <p:cNvPr id="46" name="Cylinder 45">
+            <a:extLst>
+              <a:ext uri="{FF2B5EF4-FFF2-40B4-BE49-F238E27FC236}">
+                <a16:creationId xmlns:a16="http://schemas.microsoft.com/office/drawing/2014/main" id="{98F90FE6-0B58-8F93-45A6-4D737E32D79B}"/>
+              </a:ext>
+            </a:extLst>
+          </p:cNvPr>
+          <p:cNvSpPr/>
+          <p:nvPr/>
+        </p:nvSpPr>
+        <p:spPr>
+          <a:xfrm rot="16200000">
+            <a:off x="5604164" y="3960073"/>
+            <a:ext cx="526741" cy="335280"/>
+          </a:xfrm>
+          <a:prstGeom prst="can">
+            <a:avLst>
+              <a:gd name="adj" fmla="val 50000"/>
+            </a:avLst>
+          </a:prstGeom>
+          <a:solidFill>
+            <a:schemeClr val="accent2">
+              <a:lumMod val="40000"/>
+              <a:lumOff val="60000"/>
+            </a:schemeClr>
+          </a:solidFill>
+          <a:ln w="12700">
+            <a:solidFill>
+              <a:srgbClr val="C00000"/>
+            </a:solidFill>
+            <a:prstDash val="sysDash"/>
+          </a:ln>
+        </p:spPr>
+        <p:style>
+          <a:lnRef idx="2">
+            <a:schemeClr val="accent1">
+              <a:shade val="15000"/>
+            </a:schemeClr>
+          </a:lnRef>
+          <a:fillRef idx="1">
+            <a:schemeClr val="accent1"/>
+          </a:fillRef>
+          <a:effectRef idx="0">
+            <a:schemeClr val="accent1"/>
+          </a:effectRef>
+          <a:fontRef idx="minor">
+            <a:schemeClr val="lt1"/>
+          </a:fontRef>
+        </p:style>
+        <p:txBody>
+          <a:bodyPr rtlCol="0" anchor="ctr"/>
+          <a:lstStyle/>
+          <a:p>
+            <a:pPr algn="ctr"/>
+            <a:endParaRPr lang="en-US"/>
+          </a:p>
+        </p:txBody>
+      </p:sp>
+      <p:cxnSp>
+        <p:nvCxnSpPr>
+          <p:cNvPr id="19" name="Straight Arrow Connector 18">
+            <a:extLst>
+              <a:ext uri="{FF2B5EF4-FFF2-40B4-BE49-F238E27FC236}">
+                <a16:creationId xmlns:a16="http://schemas.microsoft.com/office/drawing/2014/main" id="{44B884F4-2B21-682F-2A61-8B4B980DB135}"/>
+              </a:ext>
+            </a:extLst>
+          </p:cNvPr>
+          <p:cNvCxnSpPr>
+            <a:cxnSpLocks/>
+          </p:cNvCxnSpPr>
+          <p:nvPr/>
+        </p:nvCxnSpPr>
+        <p:spPr>
+          <a:xfrm flipH="1" flipV="1">
+            <a:off x="2519645" y="3995540"/>
+            <a:ext cx="3292786" cy="143989"/>
+          </a:xfrm>
+          <a:prstGeom prst="straightConnector1">
+            <a:avLst/>
+          </a:prstGeom>
+          <a:ln w="57150">
+            <a:solidFill>
+              <a:srgbClr val="00B050"/>
+            </a:solidFill>
+            <a:tailEnd type="triangle"/>
+          </a:ln>
+        </p:spPr>
+        <p:style>
+          <a:lnRef idx="1">
+            <a:schemeClr val="accent1"/>
+          </a:lnRef>
+          <a:fillRef idx="0">
+            <a:schemeClr val="accent1"/>
+          </a:fillRef>
+          <a:effectRef idx="0">
+            <a:schemeClr val="accent1"/>
+          </a:effectRef>
+          <a:fontRef idx="minor">
+            <a:schemeClr val="tx1"/>
+          </a:fontRef>
+        </p:style>
+      </p:cxnSp>
+      <p:cxnSp>
+        <p:nvCxnSpPr>
+          <p:cNvPr id="21" name="Straight Arrow Connector 20">
+            <a:extLst>
+              <a:ext uri="{FF2B5EF4-FFF2-40B4-BE49-F238E27FC236}">
+                <a16:creationId xmlns:a16="http://schemas.microsoft.com/office/drawing/2014/main" id="{62F08A12-9DFE-6F74-7A93-CD89B3EA6A6F}"/>
+              </a:ext>
+            </a:extLst>
+          </p:cNvPr>
+          <p:cNvCxnSpPr>
+            <a:cxnSpLocks/>
+          </p:cNvCxnSpPr>
+          <p:nvPr/>
+        </p:nvCxnSpPr>
+        <p:spPr>
+          <a:xfrm flipH="1">
+            <a:off x="3201635" y="4139529"/>
+            <a:ext cx="2610796" cy="471216"/>
+          </a:xfrm>
+          <a:prstGeom prst="straightConnector1">
+            <a:avLst/>
+          </a:prstGeom>
+          <a:ln w="57150">
+            <a:solidFill>
+              <a:srgbClr val="C00000"/>
+            </a:solidFill>
+            <a:tailEnd type="triangle"/>
+          </a:ln>
+        </p:spPr>
+        <p:style>
+          <a:lnRef idx="1">
+            <a:schemeClr val="accent1"/>
+          </a:lnRef>
+          <a:fillRef idx="0">
+            <a:schemeClr val="accent1"/>
+          </a:fillRef>
+          <a:effectRef idx="0">
+            <a:schemeClr val="accent1"/>
+          </a:effectRef>
+          <a:fontRef idx="minor">
+            <a:schemeClr val="tx1"/>
+          </a:fontRef>
+        </p:style>
+      </p:cxnSp>
+      <p:pic>
+        <p:nvPicPr>
+          <p:cNvPr id="9" name="Content Placeholder 4">
+            <a:extLst>
+              <a:ext uri="{FF2B5EF4-FFF2-40B4-BE49-F238E27FC236}">
+                <a16:creationId xmlns:a16="http://schemas.microsoft.com/office/drawing/2014/main" id="{C9004A7B-34B7-CC8F-56D5-C44ED3AA2587}"/>
+              </a:ext>
+            </a:extLst>
+          </p:cNvPr>
+          <p:cNvPicPr>
+            <a:picLocks noChangeAspect="1"/>
+          </p:cNvPicPr>
+          <p:nvPr/>
+        </p:nvPicPr>
+        <p:blipFill rotWithShape="1">
+          <a:blip r:embed="rId7">
+            <a:clrChange>
+              <a:clrFrom>
+                <a:srgbClr val="FFFFFF"/>
+              </a:clrFrom>
+              <a:clrTo>
+                <a:srgbClr val="FFFFFF">
+                  <a:alpha val="0"/>
+                </a:srgbClr>
+              </a:clrTo>
+            </a:clrChange>
+            <a:extLst>
+              <a:ext uri="{BEBA8EAE-BF5A-486C-A8C5-ECC9F3942E4B}">
+                <a14:imgProps xmlns:a14="http://schemas.microsoft.com/office/drawing/2010/main">
+                  <a14:imgLayer r:embed="rId8">
+                    <a14:imgEffect>
+                      <a14:backgroundRemoval t="10000" b="90000" l="10000" r="90000"/>
+                    </a14:imgEffect>
+                  </a14:imgLayer>
+                </a14:imgProps>
+              </a:ext>
+              <a:ext uri="{28A0092B-C50C-407E-A947-70E740481C1C}">
+                <a14:useLocalDpi xmlns:a14="http://schemas.microsoft.com/office/drawing/2010/main" val="0"/>
+              </a:ext>
+            </a:extLst>
+          </a:blip>
+          <a:srcRect l="40515" t="48504" r="50000" b="30248"/>
+          <a:stretch/>
+        </p:blipFill>
+        <p:spPr>
+          <a:xfrm>
+            <a:off x="4966368" y="3599305"/>
+            <a:ext cx="706120" cy="924569"/>
+          </a:xfrm>
+          <a:prstGeom prst="rect">
+            <a:avLst/>
+          </a:prstGeom>
+        </p:spPr>
+      </p:pic>
+      <p:cxnSp>
+        <p:nvCxnSpPr>
+          <p:cNvPr id="47" name="Straight Arrow Connector 46">
+            <a:extLst>
+              <a:ext uri="{FF2B5EF4-FFF2-40B4-BE49-F238E27FC236}">
+                <a16:creationId xmlns:a16="http://schemas.microsoft.com/office/drawing/2014/main" id="{A89922EB-1C44-9437-5867-6E06161D8943}"/>
+              </a:ext>
+            </a:extLst>
+          </p:cNvPr>
+          <p:cNvCxnSpPr>
+            <a:cxnSpLocks/>
+          </p:cNvCxnSpPr>
+          <p:nvPr/>
+        </p:nvCxnSpPr>
+        <p:spPr>
+          <a:xfrm flipH="1" flipV="1">
+            <a:off x="4826425" y="4096791"/>
+            <a:ext cx="436915" cy="19106"/>
+          </a:xfrm>
+          <a:prstGeom prst="straightConnector1">
+            <a:avLst/>
+          </a:prstGeom>
+          <a:ln w="57150">
+            <a:solidFill>
+              <a:srgbClr val="00B050"/>
+            </a:solidFill>
+            <a:headEnd type="none" w="med" len="med"/>
+            <a:tailEnd type="none" w="med" len="med"/>
+          </a:ln>
+        </p:spPr>
+        <p:style>
+          <a:lnRef idx="1">
+            <a:schemeClr val="accent1"/>
+          </a:lnRef>
+          <a:fillRef idx="0">
+            <a:schemeClr val="accent1"/>
+          </a:fillRef>
+          <a:effectRef idx="0">
+            <a:schemeClr val="accent1"/>
+          </a:effectRef>
+          <a:fontRef idx="minor">
+            <a:schemeClr val="tx1"/>
+          </a:fontRef>
+        </p:style>
+      </p:cxnSp>
+      <p:cxnSp>
+        <p:nvCxnSpPr>
+          <p:cNvPr id="49" name="Straight Arrow Connector 48">
+            <a:extLst>
+              <a:ext uri="{FF2B5EF4-FFF2-40B4-BE49-F238E27FC236}">
+                <a16:creationId xmlns:a16="http://schemas.microsoft.com/office/drawing/2014/main" id="{3BD01DFE-9714-C6D8-FB53-41C3023EAB4C}"/>
+              </a:ext>
+            </a:extLst>
+          </p:cNvPr>
+          <p:cNvCxnSpPr>
+            <a:cxnSpLocks/>
+          </p:cNvCxnSpPr>
+          <p:nvPr/>
+        </p:nvCxnSpPr>
+        <p:spPr>
+          <a:xfrm flipH="1">
+            <a:off x="4837826" y="4239971"/>
+            <a:ext cx="425514" cy="76800"/>
+          </a:xfrm>
+          <a:prstGeom prst="straightConnector1">
+            <a:avLst/>
+          </a:prstGeom>
+          <a:ln w="57150">
+            <a:solidFill>
+              <a:srgbClr val="C00000"/>
+            </a:solidFill>
+            <a:headEnd type="none" w="med" len="med"/>
+            <a:tailEnd type="none" w="med" len="med"/>
+          </a:ln>
+        </p:spPr>
+        <p:style>
+          <a:lnRef idx="1">
+            <a:schemeClr val="accent1"/>
+          </a:lnRef>
+          <a:fillRef idx="0">
+            <a:schemeClr val="accent1"/>
+          </a:fillRef>
+          <a:effectRef idx="0">
+            <a:schemeClr val="accent1"/>
+          </a:effectRef>
+          <a:fontRef idx="minor">
+            <a:schemeClr val="tx1"/>
+          </a:fontRef>
+        </p:style>
+      </p:cxnSp>
+      <p:sp>
+        <p:nvSpPr>
+          <p:cNvPr id="11" name="Cylinder 10">
+            <a:extLst>
+              <a:ext uri="{FF2B5EF4-FFF2-40B4-BE49-F238E27FC236}">
+                <a16:creationId xmlns:a16="http://schemas.microsoft.com/office/drawing/2014/main" id="{50143E4F-FF02-A645-7A91-FF1584BAEB8F}"/>
+              </a:ext>
+            </a:extLst>
+          </p:cNvPr>
+          <p:cNvSpPr/>
+          <p:nvPr/>
+        </p:nvSpPr>
+        <p:spPr>
+          <a:xfrm>
+            <a:off x="3024817" y="2454963"/>
+            <a:ext cx="1315500" cy="813734"/>
+          </a:xfrm>
+          <a:prstGeom prst="can">
+            <a:avLst>
+              <a:gd name="adj" fmla="val 29893"/>
+            </a:avLst>
+          </a:prstGeom>
+          <a:solidFill>
+            <a:srgbClr val="FCE9DC"/>
+          </a:solidFill>
+          <a:ln w="12700">
+            <a:solidFill>
+              <a:schemeClr val="accent2">
+                <a:lumMod val="60000"/>
+                <a:lumOff val="40000"/>
+              </a:schemeClr>
+            </a:solidFill>
+            <a:prstDash val="sysDash"/>
+          </a:ln>
+        </p:spPr>
+        <p:style>
+          <a:lnRef idx="2">
+            <a:schemeClr val="accent1">
+              <a:shade val="15000"/>
+            </a:schemeClr>
+          </a:lnRef>
+          <a:fillRef idx="1">
+            <a:schemeClr val="accent1"/>
+          </a:fillRef>
+          <a:effectRef idx="0">
+            <a:schemeClr val="accent1"/>
+          </a:effectRef>
+          <a:fontRef idx="minor">
+            <a:schemeClr val="lt1"/>
+          </a:fontRef>
+        </p:style>
+        <p:txBody>
+          <a:bodyPr rtlCol="0" anchor="ctr"/>
+          <a:lstStyle/>
+          <a:p>
+            <a:pPr algn="ctr"/>
+            <a:endParaRPr lang="en-US" sz="1100" b="1" dirty="0">
+              <a:solidFill>
+                <a:schemeClr val="tx1"/>
+              </a:solidFill>
+            </a:endParaRPr>
+          </a:p>
+          <a:p>
+            <a:pPr algn="ctr"/>
+            <a:r>
+              <a:rPr lang="en-US" sz="1100" b="1" dirty="0">
+                <a:solidFill>
+                  <a:schemeClr val="tx1"/>
+                </a:solidFill>
+              </a:rPr>
+              <a:t>40cm radius,</a:t>
+            </a:r>
+          </a:p>
+          <a:p>
+            <a:pPr algn="ctr"/>
+            <a:r>
+              <a:rPr lang="en-US" sz="1100" b="1" dirty="0">
+                <a:solidFill>
+                  <a:schemeClr val="tx1"/>
+                </a:solidFill>
+              </a:rPr>
+              <a:t>10cm height,</a:t>
+            </a:r>
+          </a:p>
+          <a:p>
+            <a:pPr algn="ctr"/>
+            <a:r>
+              <a:rPr lang="en-US" sz="1100" b="1" dirty="0">
+                <a:solidFill>
+                  <a:schemeClr val="tx1"/>
+                </a:solidFill>
+              </a:rPr>
+              <a:t>Ti-6Al-4V</a:t>
+            </a:r>
+          </a:p>
+        </p:txBody>
+      </p:sp>
+      <p:cxnSp>
+        <p:nvCxnSpPr>
+          <p:cNvPr id="15" name="Connector: Curved 14">
+            <a:extLst>
+              <a:ext uri="{FF2B5EF4-FFF2-40B4-BE49-F238E27FC236}">
+                <a16:creationId xmlns:a16="http://schemas.microsoft.com/office/drawing/2014/main" id="{D31DC25C-9324-F205-785D-DAFD8A8F3428}"/>
+              </a:ext>
+            </a:extLst>
+          </p:cNvPr>
+          <p:cNvCxnSpPr>
+            <a:cxnSpLocks/>
+            <a:stCxn id="46" idx="4"/>
+            <a:endCxn id="11" idx="4"/>
+          </p:cNvCxnSpPr>
+          <p:nvPr/>
+        </p:nvCxnSpPr>
+        <p:spPr>
+          <a:xfrm rot="16200000" flipV="1">
+            <a:off x="4602670" y="2599478"/>
+            <a:ext cx="1002513" cy="1527218"/>
+          </a:xfrm>
+          <a:prstGeom prst="curvedConnector2">
+            <a:avLst/>
+          </a:prstGeom>
+          <a:ln w="19050">
+            <a:solidFill>
+              <a:schemeClr val="tx1"/>
+            </a:solidFill>
+            <a:tailEnd type="triangle"/>
+          </a:ln>
+        </p:spPr>
+        <p:style>
+          <a:lnRef idx="1">
+            <a:schemeClr val="accent1"/>
+          </a:lnRef>
+          <a:fillRef idx="0">
+            <a:schemeClr val="accent1"/>
+          </a:fillRef>
+          <a:effectRef idx="0">
+            <a:schemeClr val="accent1"/>
+          </a:effectRef>
+          <a:fontRef idx="minor">
+            <a:schemeClr val="tx1"/>
+          </a:fontRef>
+        </p:style>
+      </p:cxnSp>
+    </p:spTree>
+    <p:extLst>
+      <p:ext uri="{BB962C8B-B14F-4D97-AF65-F5344CB8AC3E}">
+        <p14:creationId xmlns:p14="http://schemas.microsoft.com/office/powerpoint/2010/main" val="2898169924"/>
+      </p:ext>
+    </p:extLst>
+  </p:cSld>
+  <p:clrMapOvr>
+    <a:masterClrMapping/>
+  </p:clrMapOvr>
+</p:sld>
+</file>
+
+<file path=ppt/slides/slide14.xml><?xml version="1.0" encoding="utf-8"?>
+<p:sld xmlns:a="http://schemas.openxmlformats.org/drawingml/2006/main" xmlns:r="http://schemas.openxmlformats.org/officeDocument/2006/relationships" xmlns:p="http://schemas.openxmlformats.org/presentationml/2006/main">
+  <p:cSld>
+    <p:spTree>
+      <p:nvGrpSpPr>
+        <p:cNvPr id="1" name=""/>
+        <p:cNvGrpSpPr/>
+        <p:nvPr/>
+      </p:nvGrpSpPr>
+      <p:grpSpPr>
+        <a:xfrm>
+          <a:off x="0" y="0"/>
+          <a:ext cx="0" cy="0"/>
+          <a:chOff x="0" y="0"/>
+          <a:chExt cx="0" cy="0"/>
+        </a:xfrm>
+      </p:grpSpPr>
+      <p:sp>
+        <p:nvSpPr>
+          <p:cNvPr id="5" name="Freeform: Shape 4">
+            <a:extLst>
+              <a:ext uri="{FF2B5EF4-FFF2-40B4-BE49-F238E27FC236}">
+                <a16:creationId xmlns:a16="http://schemas.microsoft.com/office/drawing/2014/main" id="{3727639B-4FCD-CDAF-86B1-E109C8796A5D}"/>
+              </a:ext>
+            </a:extLst>
+          </p:cNvPr>
+          <p:cNvSpPr/>
+          <p:nvPr/>
+        </p:nvSpPr>
+        <p:spPr>
+          <a:xfrm>
+            <a:off x="546242" y="3273610"/>
+            <a:ext cx="10017304" cy="1028693"/>
+          </a:xfrm>
+          <a:custGeom>
+            <a:avLst/>
+            <a:gdLst>
+              <a:gd name="connsiteX0" fmla="*/ 0 w 10017304"/>
+              <a:gd name="connsiteY0" fmla="*/ 986389 h 1027486"/>
+              <a:gd name="connsiteX1" fmla="*/ 4808306 w 10017304"/>
+              <a:gd name="connsiteY1" fmla="*/ 70 h 1027486"/>
+              <a:gd name="connsiteX2" fmla="*/ 10017304 w 10017304"/>
+              <a:gd name="connsiteY2" fmla="*/ 1027486 h 1027486"/>
+              <a:gd name="connsiteX0" fmla="*/ 0 w 10017304"/>
+              <a:gd name="connsiteY0" fmla="*/ 988695 h 1029792"/>
+              <a:gd name="connsiteX1" fmla="*/ 4808306 w 10017304"/>
+              <a:gd name="connsiteY1" fmla="*/ 2376 h 1029792"/>
+              <a:gd name="connsiteX2" fmla="*/ 10017304 w 10017304"/>
+              <a:gd name="connsiteY2" fmla="*/ 1029792 h 1029792"/>
+              <a:gd name="connsiteX0" fmla="*/ 0 w 10017304"/>
+              <a:gd name="connsiteY0" fmla="*/ 989424 h 1030521"/>
+              <a:gd name="connsiteX1" fmla="*/ 4808306 w 10017304"/>
+              <a:gd name="connsiteY1" fmla="*/ 3105 h 1030521"/>
+              <a:gd name="connsiteX2" fmla="*/ 10017304 w 10017304"/>
+              <a:gd name="connsiteY2" fmla="*/ 1030521 h 1030521"/>
+              <a:gd name="connsiteX0" fmla="*/ 0 w 10017304"/>
+              <a:gd name="connsiteY0" fmla="*/ 989424 h 1030521"/>
+              <a:gd name="connsiteX1" fmla="*/ 4808306 w 10017304"/>
+              <a:gd name="connsiteY1" fmla="*/ 3105 h 1030521"/>
+              <a:gd name="connsiteX2" fmla="*/ 10017304 w 10017304"/>
+              <a:gd name="connsiteY2" fmla="*/ 1030521 h 1030521"/>
+              <a:gd name="connsiteX0" fmla="*/ 0 w 10017304"/>
+              <a:gd name="connsiteY0" fmla="*/ 987596 h 1028693"/>
+              <a:gd name="connsiteX1" fmla="*/ 4808306 w 10017304"/>
+              <a:gd name="connsiteY1" fmla="*/ 1277 h 1028693"/>
+              <a:gd name="connsiteX2" fmla="*/ 10017304 w 10017304"/>
+              <a:gd name="connsiteY2" fmla="*/ 1028693 h 1028693"/>
+            </a:gdLst>
+            <a:ahLst/>
+            <a:cxnLst>
+              <a:cxn ang="0">
+                <a:pos x="connsiteX0" y="connsiteY0"/>
+              </a:cxn>
+              <a:cxn ang="0">
+                <a:pos x="connsiteX1" y="connsiteY1"/>
+              </a:cxn>
+              <a:cxn ang="0">
+                <a:pos x="connsiteX2" y="connsiteY2"/>
+              </a:cxn>
+            </a:cxnLst>
+            <a:rect l="l" t="t" r="r" b="b"/>
+            <a:pathLst>
+              <a:path w="10017304" h="1028693">
+                <a:moveTo>
+                  <a:pt x="0" y="987596"/>
+                </a:moveTo>
+                <a:cubicBezTo>
+                  <a:pt x="788541" y="573204"/>
+                  <a:pt x="2049695" y="35525"/>
+                  <a:pt x="4808306" y="1277"/>
+                </a:cubicBezTo>
+                <a:cubicBezTo>
+                  <a:pt x="7566917" y="-32971"/>
+                  <a:pt x="9263866" y="629713"/>
+                  <a:pt x="10017304" y="1028693"/>
+                </a:cubicBezTo>
+              </a:path>
+            </a:pathLst>
+          </a:custGeom>
+          <a:noFill/>
+          <a:ln w="28575"/>
+        </p:spPr>
+        <p:style>
+          <a:lnRef idx="2">
+            <a:schemeClr val="accent1">
+              <a:shade val="15000"/>
+            </a:schemeClr>
+          </a:lnRef>
+          <a:fillRef idx="1">
+            <a:schemeClr val="accent1"/>
+          </a:fillRef>
+          <a:effectRef idx="0">
+            <a:schemeClr val="accent1"/>
+          </a:effectRef>
+          <a:fontRef idx="minor">
+            <a:schemeClr val="lt1"/>
+          </a:fontRef>
+        </p:style>
+        <p:txBody>
+          <a:bodyPr rtlCol="0" anchor="ctr"/>
+          <a:lstStyle/>
+          <a:p>
+            <a:pPr algn="ctr"/>
+            <a:endParaRPr lang="en-US"/>
+          </a:p>
+        </p:txBody>
+      </p:sp>
+      <p:pic>
+        <p:nvPicPr>
+          <p:cNvPr id="4" name="Picture 3">
+            <a:extLst>
+              <a:ext uri="{FF2B5EF4-FFF2-40B4-BE49-F238E27FC236}">
+                <a16:creationId xmlns:a16="http://schemas.microsoft.com/office/drawing/2014/main" id="{BDA06D0B-9E2D-A58F-7906-82EF80CC9581}"/>
+              </a:ext>
+            </a:extLst>
+          </p:cNvPr>
+          <p:cNvPicPr>
+            <a:picLocks noChangeAspect="1"/>
+          </p:cNvPicPr>
+          <p:nvPr/>
+        </p:nvPicPr>
+        <p:blipFill>
+          <a:blip r:embed="rId2">
+            <a:extLst>
+              <a:ext uri="{BEBA8EAE-BF5A-486C-A8C5-ECC9F3942E4B}">
+                <a14:imgProps xmlns:a14="http://schemas.microsoft.com/office/drawing/2010/main">
+                  <a14:imgLayer r:embed="rId3">
+                    <a14:imgEffect>
+                      <a14:brightnessContrast bright="20000" contrast="-40000"/>
+                    </a14:imgEffect>
+                  </a14:imgLayer>
+                </a14:imgProps>
+              </a:ext>
+              <a:ext uri="{28A0092B-C50C-407E-A947-70E740481C1C}">
+                <a14:useLocalDpi xmlns:a14="http://schemas.microsoft.com/office/drawing/2010/main" val="0"/>
+              </a:ext>
+            </a:extLst>
+          </a:blip>
+          <a:stretch>
+            <a:fillRect/>
+          </a:stretch>
+        </p:blipFill>
+        <p:spPr>
+          <a:xfrm>
+            <a:off x="2506894" y="1127750"/>
+            <a:ext cx="6096000" cy="2814958"/>
+          </a:xfrm>
+          <a:prstGeom prst="rect">
+            <a:avLst/>
+          </a:prstGeom>
+        </p:spPr>
+      </p:pic>
+      <p:cxnSp>
+        <p:nvCxnSpPr>
+          <p:cNvPr id="7" name="Straight Arrow Connector 6">
+            <a:extLst>
+              <a:ext uri="{FF2B5EF4-FFF2-40B4-BE49-F238E27FC236}">
+                <a16:creationId xmlns:a16="http://schemas.microsoft.com/office/drawing/2014/main" id="{5B03BACD-69A9-F839-D896-C735AB594BC9}"/>
+              </a:ext>
+            </a:extLst>
+          </p:cNvPr>
+          <p:cNvCxnSpPr>
+            <a:cxnSpLocks/>
+          </p:cNvCxnSpPr>
+          <p:nvPr/>
+        </p:nvCxnSpPr>
+        <p:spPr>
+          <a:xfrm flipV="1">
+            <a:off x="5543187" y="1142568"/>
+            <a:ext cx="0" cy="988309"/>
+          </a:xfrm>
+          <a:prstGeom prst="straightConnector1">
+            <a:avLst/>
+          </a:prstGeom>
+          <a:ln w="57150">
+            <a:solidFill>
+              <a:srgbClr val="1122FF"/>
+            </a:solidFill>
+            <a:tailEnd type="triangle"/>
+          </a:ln>
+        </p:spPr>
+        <p:style>
+          <a:lnRef idx="1">
+            <a:schemeClr val="accent1"/>
+          </a:lnRef>
+          <a:fillRef idx="0">
+            <a:schemeClr val="accent1"/>
+          </a:fillRef>
+          <a:effectRef idx="0">
+            <a:schemeClr val="accent1"/>
+          </a:effectRef>
+          <a:fontRef idx="minor">
+            <a:schemeClr val="tx1"/>
+          </a:fontRef>
+        </p:style>
+      </p:cxnSp>
+      <p:cxnSp>
+        <p:nvCxnSpPr>
+          <p:cNvPr id="8" name="Straight Arrow Connector 7">
+            <a:extLst>
+              <a:ext uri="{FF2B5EF4-FFF2-40B4-BE49-F238E27FC236}">
+                <a16:creationId xmlns:a16="http://schemas.microsoft.com/office/drawing/2014/main" id="{F7DEAE03-C87D-BECE-89B3-90EE18D38953}"/>
+              </a:ext>
+            </a:extLst>
+          </p:cNvPr>
+          <p:cNvCxnSpPr>
+            <a:cxnSpLocks/>
+          </p:cNvCxnSpPr>
+          <p:nvPr/>
+        </p:nvCxnSpPr>
+        <p:spPr>
+          <a:xfrm flipH="1">
+            <a:off x="4381500" y="2130877"/>
+            <a:ext cx="1161687" cy="0"/>
+          </a:xfrm>
+          <a:prstGeom prst="straightConnector1">
+            <a:avLst/>
+          </a:prstGeom>
+          <a:ln w="57150">
+            <a:solidFill>
+              <a:srgbClr val="C00000"/>
+            </a:solidFill>
+            <a:tailEnd type="triangle"/>
+          </a:ln>
+        </p:spPr>
+        <p:style>
+          <a:lnRef idx="1">
+            <a:schemeClr val="accent1"/>
+          </a:lnRef>
+          <a:fillRef idx="0">
+            <a:schemeClr val="accent1"/>
+          </a:fillRef>
+          <a:effectRef idx="0">
+            <a:schemeClr val="accent1"/>
+          </a:effectRef>
+          <a:fontRef idx="minor">
+            <a:schemeClr val="tx1"/>
+          </a:fontRef>
+        </p:style>
+      </p:cxnSp>
+      <p:sp>
+        <p:nvSpPr>
+          <p:cNvPr id="9" name="Oval 8">
+            <a:extLst>
+              <a:ext uri="{FF2B5EF4-FFF2-40B4-BE49-F238E27FC236}">
+                <a16:creationId xmlns:a16="http://schemas.microsoft.com/office/drawing/2014/main" id="{06486212-9612-C7E6-F322-6B8A5E32CC52}"/>
+              </a:ext>
+            </a:extLst>
+          </p:cNvPr>
+          <p:cNvSpPr/>
+          <p:nvPr/>
+        </p:nvSpPr>
+        <p:spPr>
+          <a:xfrm>
+            <a:off x="5436058" y="2023747"/>
+            <a:ext cx="214259" cy="214259"/>
+          </a:xfrm>
+          <a:prstGeom prst="ellipse">
+            <a:avLst/>
+          </a:prstGeom>
+          <a:solidFill>
+            <a:srgbClr val="00B050"/>
+          </a:solidFill>
+          <a:ln w="28575">
+            <a:solidFill>
+              <a:schemeClr val="bg1"/>
+            </a:solidFill>
+          </a:ln>
+        </p:spPr>
+        <p:style>
+          <a:lnRef idx="2">
+            <a:schemeClr val="accent1">
+              <a:shade val="15000"/>
+            </a:schemeClr>
+          </a:lnRef>
+          <a:fillRef idx="1">
+            <a:schemeClr val="accent1"/>
+          </a:fillRef>
+          <a:effectRef idx="0">
+            <a:schemeClr val="accent1"/>
+          </a:effectRef>
+          <a:fontRef idx="minor">
+            <a:schemeClr val="lt1"/>
+          </a:fontRef>
+        </p:style>
+        <p:txBody>
+          <a:bodyPr rtlCol="0" anchor="ctr"/>
+          <a:lstStyle/>
+          <a:p>
+            <a:pPr algn="ctr"/>
+            <a:endParaRPr lang="en-US"/>
+          </a:p>
+        </p:txBody>
+      </p:sp>
+      <mc:AlternateContent xmlns:mc="http://schemas.openxmlformats.org/markup-compatibility/2006">
+        <mc:Choice xmlns:a14="http://schemas.microsoft.com/office/drawing/2010/main" Requires="a14">
+          <p:sp>
+            <p:nvSpPr>
+              <p:cNvPr id="11" name="TextBox 10">
+                <a:extLst>
+                  <a:ext uri="{FF2B5EF4-FFF2-40B4-BE49-F238E27FC236}">
+                    <a16:creationId xmlns:a16="http://schemas.microsoft.com/office/drawing/2014/main" id="{658C3BC9-1605-3A4C-2BDD-6CDD49928875}"/>
+                  </a:ext>
+                </a:extLst>
+              </p:cNvPr>
+              <p:cNvSpPr txBox="1"/>
+              <p:nvPr/>
+            </p:nvSpPr>
+            <p:spPr>
+              <a:xfrm>
+                <a:off x="3282325" y="1946210"/>
+                <a:ext cx="1020471" cy="379206"/>
+              </a:xfrm>
+              <a:prstGeom prst="rect">
+                <a:avLst/>
+              </a:prstGeom>
+              <a:noFill/>
+            </p:spPr>
+            <p:txBody>
+              <a:bodyPr wrap="none" lIns="0" tIns="0" rIns="0" bIns="0" rtlCol="0">
+                <a:spAutoFit/>
+              </a:bodyPr>
+              <a:lstStyle/>
+              <a:p>
+                <a:pPr/>
+                <a14:m>
+                  <m:oMathPara xmlns:m="http://schemas.openxmlformats.org/officeDocument/2006/math">
+                    <m:oMathParaPr>
+                      <m:jc m:val="centerGroup"/>
+                    </m:oMathParaPr>
+                    <m:oMath xmlns:m="http://schemas.openxmlformats.org/officeDocument/2006/math">
+                      <m:acc>
+                        <m:accPr>
+                          <m:chr m:val="̂"/>
+                          <m:ctrlPr>
+                            <a:rPr lang="en-US" sz="2400" i="1" smtClean="0">
+                              <a:latin typeface="Cambria Math" panose="02040503050406030204" pitchFamily="18" charset="0"/>
+                            </a:rPr>
+                          </m:ctrlPr>
+                        </m:accPr>
+                        <m:e>
+                          <m:r>
+                            <a:rPr lang="en-US" sz="2400" b="0" i="1" smtClean="0">
+                              <a:latin typeface="Cambria Math" panose="02040503050406030204" pitchFamily="18" charset="0"/>
+                            </a:rPr>
+                            <m:t>𝑇</m:t>
+                          </m:r>
+                        </m:e>
+                      </m:acc>
+                      <m:r>
+                        <a:rPr lang="en-US" sz="2400" b="0" i="1" smtClean="0">
+                          <a:latin typeface="Cambria Math" panose="02040503050406030204" pitchFamily="18" charset="0"/>
+                        </a:rPr>
+                        <m:t>=</m:t>
+                      </m:r>
+                      <m:sSub>
+                        <m:sSubPr>
+                          <m:ctrlPr>
+                            <a:rPr lang="en-US" sz="2400" i="1" smtClean="0">
+                              <a:latin typeface="Cambria Math" panose="02040503050406030204" pitchFamily="18" charset="0"/>
+                            </a:rPr>
+                          </m:ctrlPr>
+                        </m:sSubPr>
+                        <m:e>
+                          <m:acc>
+                            <m:accPr>
+                              <m:chr m:val="̂"/>
+                              <m:ctrlPr>
+                                <a:rPr lang="en-US" sz="2400" i="1" smtClean="0">
+                                  <a:latin typeface="Cambria Math" panose="02040503050406030204" pitchFamily="18" charset="0"/>
+                                </a:rPr>
+                              </m:ctrlPr>
+                            </m:accPr>
+                            <m:e>
+                              <m:r>
+                                <a:rPr lang="en-US" sz="2400" b="0" i="1" smtClean="0">
+                                  <a:latin typeface="Cambria Math" panose="02040503050406030204" pitchFamily="18" charset="0"/>
+                                </a:rPr>
+                                <m:t>𝑦</m:t>
+                              </m:r>
+                            </m:e>
+                          </m:acc>
+                        </m:e>
+                        <m:sub>
+                          <m:r>
+                            <a:rPr lang="en-US" sz="2400" b="0" i="1" smtClean="0">
+                              <a:latin typeface="Cambria Math" panose="02040503050406030204" pitchFamily="18" charset="0"/>
+                            </a:rPr>
+                            <m:t>𝐵</m:t>
+                          </m:r>
+                        </m:sub>
+                      </m:sSub>
+                    </m:oMath>
+                  </m:oMathPara>
+                </a14:m>
+                <a:endParaRPr lang="en-US" sz="2400" dirty="0"/>
+              </a:p>
+            </p:txBody>
+          </p:sp>
+        </mc:Choice>
+        <mc:Fallback>
+          <p:sp>
+            <p:nvSpPr>
+              <p:cNvPr id="11" name="TextBox 10">
+                <a:extLst>
+                  <a:ext uri="{FF2B5EF4-FFF2-40B4-BE49-F238E27FC236}">
+                    <a16:creationId xmlns:a16="http://schemas.microsoft.com/office/drawing/2014/main" id="{658C3BC9-1605-3A4C-2BDD-6CDD49928875}"/>
+                  </a:ext>
+                </a:extLst>
+              </p:cNvPr>
+              <p:cNvSpPr txBox="1">
+                <a:spLocks noRot="1" noChangeAspect="1" noMove="1" noResize="1" noEditPoints="1" noAdjustHandles="1" noChangeArrowheads="1" noChangeShapeType="1" noTextEdit="1"/>
+              </p:cNvSpPr>
+              <p:nvPr/>
+            </p:nvSpPr>
+            <p:spPr>
+              <a:xfrm>
+                <a:off x="3282325" y="1946210"/>
+                <a:ext cx="1020471" cy="379206"/>
+              </a:xfrm>
+              <a:prstGeom prst="rect">
+                <a:avLst/>
+              </a:prstGeom>
+              <a:blipFill>
+                <a:blip r:embed="rId4"/>
+                <a:stretch>
+                  <a:fillRect l="-4762" t="-17742" r="-27381" b="-25806"/>
+                </a:stretch>
+              </a:blipFill>
+            </p:spPr>
+            <p:txBody>
+              <a:bodyPr/>
+              <a:lstStyle/>
+              <a:p>
+                <a:r>
+                  <a:rPr lang="en-US">
+                    <a:noFill/>
+                  </a:rPr>
+                  <a:t> </a:t>
+                </a:r>
+              </a:p>
+            </p:txBody>
+          </p:sp>
+        </mc:Fallback>
+      </mc:AlternateContent>
+      <mc:AlternateContent xmlns:mc="http://schemas.openxmlformats.org/markup-compatibility/2006">
+        <mc:Choice xmlns:a14="http://schemas.microsoft.com/office/drawing/2010/main" Requires="a14">
+          <p:sp>
+            <p:nvSpPr>
+              <p:cNvPr id="14" name="TextBox 13">
+                <a:extLst>
+                  <a:ext uri="{FF2B5EF4-FFF2-40B4-BE49-F238E27FC236}">
+                    <a16:creationId xmlns:a16="http://schemas.microsoft.com/office/drawing/2014/main" id="{5E8CB281-9362-D9DD-A86E-CB0DB783BB82}"/>
+                  </a:ext>
+                </a:extLst>
+              </p:cNvPr>
+              <p:cNvSpPr txBox="1"/>
+              <p:nvPr/>
+            </p:nvSpPr>
+            <p:spPr>
+              <a:xfrm>
+                <a:off x="5729021" y="1202472"/>
+                <a:ext cx="1036502" cy="379206"/>
+              </a:xfrm>
+              <a:prstGeom prst="rect">
+                <a:avLst/>
+              </a:prstGeom>
+              <a:noFill/>
+            </p:spPr>
+            <p:txBody>
+              <a:bodyPr wrap="none" lIns="0" tIns="0" rIns="0" bIns="0" rtlCol="0">
+                <a:spAutoFit/>
+              </a:bodyPr>
+              <a:lstStyle/>
+              <a:p>
+                <a:pPr/>
+                <a14:m>
+                  <m:oMathPara xmlns:m="http://schemas.openxmlformats.org/officeDocument/2006/math">
+                    <m:oMathParaPr>
+                      <m:jc m:val="centerGroup"/>
+                    </m:oMathParaPr>
+                    <m:oMath xmlns:m="http://schemas.openxmlformats.org/officeDocument/2006/math">
+                      <m:acc>
+                        <m:accPr>
+                          <m:chr m:val="̂"/>
+                          <m:ctrlPr>
+                            <a:rPr lang="en-US" sz="2400" i="1" smtClean="0">
+                              <a:latin typeface="Cambria Math" panose="02040503050406030204" pitchFamily="18" charset="0"/>
+                            </a:rPr>
+                          </m:ctrlPr>
+                        </m:accPr>
+                        <m:e>
+                          <m:r>
+                            <a:rPr lang="en-US" sz="2400" b="0" i="1" smtClean="0">
+                              <a:latin typeface="Cambria Math" panose="02040503050406030204" pitchFamily="18" charset="0"/>
+                            </a:rPr>
+                            <m:t>𝑅</m:t>
+                          </m:r>
+                        </m:e>
+                      </m:acc>
+                      <m:r>
+                        <a:rPr lang="en-US" sz="2400" b="0" i="1" smtClean="0">
+                          <a:latin typeface="Cambria Math" panose="02040503050406030204" pitchFamily="18" charset="0"/>
+                        </a:rPr>
+                        <m:t>=</m:t>
+                      </m:r>
+                      <m:sSub>
+                        <m:sSubPr>
+                          <m:ctrlPr>
+                            <a:rPr lang="en-US" sz="2400" i="1" smtClean="0">
+                              <a:latin typeface="Cambria Math" panose="02040503050406030204" pitchFamily="18" charset="0"/>
+                            </a:rPr>
+                          </m:ctrlPr>
+                        </m:sSubPr>
+                        <m:e>
+                          <m:acc>
+                            <m:accPr>
+                              <m:chr m:val="̂"/>
+                              <m:ctrlPr>
+                                <a:rPr lang="en-US" sz="2400" i="1" smtClean="0">
+                                  <a:latin typeface="Cambria Math" panose="02040503050406030204" pitchFamily="18" charset="0"/>
+                                </a:rPr>
+                              </m:ctrlPr>
+                            </m:accPr>
+                            <m:e>
+                              <m:r>
+                                <a:rPr lang="en-US" sz="2400" b="0" i="1" smtClean="0">
+                                  <a:latin typeface="Cambria Math" panose="02040503050406030204" pitchFamily="18" charset="0"/>
+                                </a:rPr>
+                                <m:t>𝑥</m:t>
+                              </m:r>
+                            </m:e>
+                          </m:acc>
+                        </m:e>
+                        <m:sub>
+                          <m:r>
+                            <a:rPr lang="en-US" sz="2400" b="0" i="1" smtClean="0">
+                              <a:latin typeface="Cambria Math" panose="02040503050406030204" pitchFamily="18" charset="0"/>
+                            </a:rPr>
+                            <m:t>𝐵</m:t>
+                          </m:r>
+                        </m:sub>
+                      </m:sSub>
+                    </m:oMath>
+                  </m:oMathPara>
+                </a14:m>
+                <a:endParaRPr lang="en-US" sz="2400" dirty="0"/>
+              </a:p>
+            </p:txBody>
+          </p:sp>
+        </mc:Choice>
+        <mc:Fallback>
+          <p:sp>
+            <p:nvSpPr>
+              <p:cNvPr id="14" name="TextBox 13">
+                <a:extLst>
+                  <a:ext uri="{FF2B5EF4-FFF2-40B4-BE49-F238E27FC236}">
+                    <a16:creationId xmlns:a16="http://schemas.microsoft.com/office/drawing/2014/main" id="{5E8CB281-9362-D9DD-A86E-CB0DB783BB82}"/>
+                  </a:ext>
+                </a:extLst>
+              </p:cNvPr>
+              <p:cNvSpPr txBox="1">
+                <a:spLocks noRot="1" noChangeAspect="1" noMove="1" noResize="1" noEditPoints="1" noAdjustHandles="1" noChangeArrowheads="1" noChangeShapeType="1" noTextEdit="1"/>
+              </p:cNvSpPr>
+              <p:nvPr/>
+            </p:nvSpPr>
+            <p:spPr>
+              <a:xfrm>
+                <a:off x="5729021" y="1202472"/>
+                <a:ext cx="1036502" cy="379206"/>
+              </a:xfrm>
+              <a:prstGeom prst="rect">
+                <a:avLst/>
+              </a:prstGeom>
+              <a:blipFill>
+                <a:blip r:embed="rId5"/>
+                <a:stretch>
+                  <a:fillRect l="-5294" t="-17742" r="-26471" b="-14516"/>
+                </a:stretch>
+              </a:blipFill>
+            </p:spPr>
+            <p:txBody>
+              <a:bodyPr/>
+              <a:lstStyle/>
+              <a:p>
+                <a:r>
+                  <a:rPr lang="en-US">
+                    <a:noFill/>
+                  </a:rPr>
+                  <a:t> </a:t>
+                </a:r>
+              </a:p>
+            </p:txBody>
+          </p:sp>
+        </mc:Fallback>
+      </mc:AlternateContent>
+      <mc:AlternateContent xmlns:mc="http://schemas.openxmlformats.org/markup-compatibility/2006">
+        <mc:Choice xmlns:a14="http://schemas.microsoft.com/office/drawing/2010/main" Requires="a14">
+          <p:sp>
+            <p:nvSpPr>
+              <p:cNvPr id="15" name="TextBox 14">
+                <a:extLst>
+                  <a:ext uri="{FF2B5EF4-FFF2-40B4-BE49-F238E27FC236}">
+                    <a16:creationId xmlns:a16="http://schemas.microsoft.com/office/drawing/2014/main" id="{8C9A919A-4930-99C9-E436-310B42FB374D}"/>
+                  </a:ext>
+                </a:extLst>
+              </p:cNvPr>
+              <p:cNvSpPr txBox="1"/>
+              <p:nvPr/>
+            </p:nvSpPr>
+            <p:spPr>
+              <a:xfrm>
+                <a:off x="5729021" y="1941273"/>
+                <a:ext cx="1015278" cy="379206"/>
+              </a:xfrm>
+              <a:prstGeom prst="rect">
+                <a:avLst/>
+              </a:prstGeom>
+              <a:noFill/>
+            </p:spPr>
+            <p:txBody>
+              <a:bodyPr wrap="none" lIns="0" tIns="0" rIns="0" bIns="0" rtlCol="0">
+                <a:spAutoFit/>
+              </a:bodyPr>
+              <a:lstStyle/>
+              <a:p>
+                <a:pPr/>
+                <a14:m>
+                  <m:oMathPara xmlns:m="http://schemas.openxmlformats.org/officeDocument/2006/math">
+                    <m:oMathParaPr>
+                      <m:jc m:val="centerGroup"/>
+                    </m:oMathParaPr>
+                    <m:oMath xmlns:m="http://schemas.openxmlformats.org/officeDocument/2006/math">
+                      <m:acc>
+                        <m:accPr>
+                          <m:chr m:val="̂"/>
+                          <m:ctrlPr>
+                            <a:rPr lang="en-US" sz="2400" i="1" smtClean="0">
+                              <a:latin typeface="Cambria Math" panose="02040503050406030204" pitchFamily="18" charset="0"/>
+                            </a:rPr>
+                          </m:ctrlPr>
+                        </m:accPr>
+                        <m:e>
+                          <m:r>
+                            <a:rPr lang="en-US" sz="2400" b="0" i="1" smtClean="0">
+                              <a:latin typeface="Cambria Math" panose="02040503050406030204" pitchFamily="18" charset="0"/>
+                            </a:rPr>
+                            <m:t>𝑁</m:t>
+                          </m:r>
+                        </m:e>
+                      </m:acc>
+                      <m:r>
+                        <a:rPr lang="en-US" sz="2400" b="0" i="1" smtClean="0">
+                          <a:latin typeface="Cambria Math" panose="02040503050406030204" pitchFamily="18" charset="0"/>
+                        </a:rPr>
+                        <m:t>=</m:t>
+                      </m:r>
+                      <m:sSub>
+                        <m:sSubPr>
+                          <m:ctrlPr>
+                            <a:rPr lang="en-US" sz="2400" i="1" smtClean="0">
+                              <a:latin typeface="Cambria Math" panose="02040503050406030204" pitchFamily="18" charset="0"/>
+                            </a:rPr>
+                          </m:ctrlPr>
+                        </m:sSubPr>
+                        <m:e>
+                          <m:acc>
+                            <m:accPr>
+                              <m:chr m:val="̂"/>
+                              <m:ctrlPr>
+                                <a:rPr lang="en-US" sz="2400" i="1" smtClean="0">
+                                  <a:latin typeface="Cambria Math" panose="02040503050406030204" pitchFamily="18" charset="0"/>
+                                </a:rPr>
+                              </m:ctrlPr>
+                            </m:accPr>
+                            <m:e>
+                              <m:r>
+                                <a:rPr lang="en-US" sz="2400" b="0" i="1" smtClean="0">
+                                  <a:latin typeface="Cambria Math" panose="02040503050406030204" pitchFamily="18" charset="0"/>
+                                </a:rPr>
+                                <m:t>𝑧</m:t>
+                              </m:r>
+                            </m:e>
+                          </m:acc>
+                        </m:e>
+                        <m:sub>
+                          <m:r>
+                            <a:rPr lang="en-US" sz="2400" b="0" i="1" smtClean="0">
+                              <a:latin typeface="Cambria Math" panose="02040503050406030204" pitchFamily="18" charset="0"/>
+                            </a:rPr>
+                            <m:t>𝐵</m:t>
+                          </m:r>
+                        </m:sub>
+                      </m:sSub>
+                    </m:oMath>
+                  </m:oMathPara>
+                </a14:m>
+                <a:endParaRPr lang="en-US" sz="2400" dirty="0"/>
+              </a:p>
+            </p:txBody>
+          </p:sp>
+        </mc:Choice>
+        <mc:Fallback>
+          <p:sp>
+            <p:nvSpPr>
+              <p:cNvPr id="15" name="TextBox 14">
+                <a:extLst>
+                  <a:ext uri="{FF2B5EF4-FFF2-40B4-BE49-F238E27FC236}">
+                    <a16:creationId xmlns:a16="http://schemas.microsoft.com/office/drawing/2014/main" id="{8C9A919A-4930-99C9-E436-310B42FB374D}"/>
+                  </a:ext>
+                </a:extLst>
+              </p:cNvPr>
+              <p:cNvSpPr txBox="1">
+                <a:spLocks noRot="1" noChangeAspect="1" noMove="1" noResize="1" noEditPoints="1" noAdjustHandles="1" noChangeArrowheads="1" noChangeShapeType="1" noTextEdit="1"/>
+              </p:cNvSpPr>
+              <p:nvPr/>
+            </p:nvSpPr>
+            <p:spPr>
+              <a:xfrm>
+                <a:off x="5729021" y="1941273"/>
+                <a:ext cx="1015278" cy="379206"/>
+              </a:xfrm>
+              <a:prstGeom prst="rect">
+                <a:avLst/>
+              </a:prstGeom>
+              <a:blipFill>
+                <a:blip r:embed="rId6"/>
+                <a:stretch>
+                  <a:fillRect l="-7229" t="-17460" r="-24096" b="-12698"/>
+                </a:stretch>
+              </a:blipFill>
+            </p:spPr>
+            <p:txBody>
+              <a:bodyPr/>
+              <a:lstStyle/>
+              <a:p>
+                <a:r>
+                  <a:rPr lang="en-US">
+                    <a:noFill/>
+                  </a:rPr>
+                  <a:t> </a:t>
+                </a:r>
+              </a:p>
+            </p:txBody>
+          </p:sp>
+        </mc:Fallback>
+      </mc:AlternateContent>
+    </p:spTree>
+    <p:extLst>
+      <p:ext uri="{BB962C8B-B14F-4D97-AF65-F5344CB8AC3E}">
+        <p14:creationId xmlns:p14="http://schemas.microsoft.com/office/powerpoint/2010/main" val="409740165"/>
+      </p:ext>
+    </p:extLst>
+  </p:cSld>
+  <p:clrMapOvr>
+    <a:masterClrMapping/>
+  </p:clrMapOvr>
+</p:sld>
+</file>
+
+<file path=ppt/slides/slide15.xml><?xml version="1.0" encoding="utf-8"?>
+<p:sld xmlns:a="http://schemas.openxmlformats.org/drawingml/2006/main" xmlns:r="http://schemas.openxmlformats.org/officeDocument/2006/relationships" xmlns:p="http://schemas.openxmlformats.org/presentationml/2006/main">
+  <p:cSld>
+    <p:spTree>
+      <p:nvGrpSpPr>
+        <p:cNvPr id="1" name=""/>
+        <p:cNvGrpSpPr/>
+        <p:nvPr/>
+      </p:nvGrpSpPr>
+      <p:grpSpPr>
+        <a:xfrm>
+          <a:off x="0" y="0"/>
+          <a:ext cx="0" cy="0"/>
+          <a:chOff x="0" y="0"/>
+          <a:chExt cx="0" cy="0"/>
+        </a:xfrm>
+      </p:grpSpPr>
+      <p:sp>
+        <p:nvSpPr>
+          <p:cNvPr id="5" name="Freeform: Shape 4">
+            <a:extLst>
+              <a:ext uri="{FF2B5EF4-FFF2-40B4-BE49-F238E27FC236}">
+                <a16:creationId xmlns:a16="http://schemas.microsoft.com/office/drawing/2014/main" id="{3727639B-4FCD-CDAF-86B1-E109C8796A5D}"/>
+              </a:ext>
+            </a:extLst>
+          </p:cNvPr>
+          <p:cNvSpPr/>
+          <p:nvPr/>
+        </p:nvSpPr>
+        <p:spPr>
+          <a:xfrm>
+            <a:off x="1277429" y="3378851"/>
+            <a:ext cx="8539537" cy="1028693"/>
+          </a:xfrm>
+          <a:custGeom>
+            <a:avLst/>
+            <a:gdLst>
+              <a:gd name="connsiteX0" fmla="*/ 0 w 10017304"/>
+              <a:gd name="connsiteY0" fmla="*/ 986389 h 1027486"/>
+              <a:gd name="connsiteX1" fmla="*/ 4808306 w 10017304"/>
+              <a:gd name="connsiteY1" fmla="*/ 70 h 1027486"/>
+              <a:gd name="connsiteX2" fmla="*/ 10017304 w 10017304"/>
+              <a:gd name="connsiteY2" fmla="*/ 1027486 h 1027486"/>
+              <a:gd name="connsiteX0" fmla="*/ 0 w 10017304"/>
+              <a:gd name="connsiteY0" fmla="*/ 988695 h 1029792"/>
+              <a:gd name="connsiteX1" fmla="*/ 4808306 w 10017304"/>
+              <a:gd name="connsiteY1" fmla="*/ 2376 h 1029792"/>
+              <a:gd name="connsiteX2" fmla="*/ 10017304 w 10017304"/>
+              <a:gd name="connsiteY2" fmla="*/ 1029792 h 1029792"/>
+              <a:gd name="connsiteX0" fmla="*/ 0 w 10017304"/>
+              <a:gd name="connsiteY0" fmla="*/ 989424 h 1030521"/>
+              <a:gd name="connsiteX1" fmla="*/ 4808306 w 10017304"/>
+              <a:gd name="connsiteY1" fmla="*/ 3105 h 1030521"/>
+              <a:gd name="connsiteX2" fmla="*/ 10017304 w 10017304"/>
+              <a:gd name="connsiteY2" fmla="*/ 1030521 h 1030521"/>
+              <a:gd name="connsiteX0" fmla="*/ 0 w 10017304"/>
+              <a:gd name="connsiteY0" fmla="*/ 989424 h 1030521"/>
+              <a:gd name="connsiteX1" fmla="*/ 4808306 w 10017304"/>
+              <a:gd name="connsiteY1" fmla="*/ 3105 h 1030521"/>
+              <a:gd name="connsiteX2" fmla="*/ 10017304 w 10017304"/>
+              <a:gd name="connsiteY2" fmla="*/ 1030521 h 1030521"/>
+              <a:gd name="connsiteX0" fmla="*/ 0 w 10017304"/>
+              <a:gd name="connsiteY0" fmla="*/ 987596 h 1028693"/>
+              <a:gd name="connsiteX1" fmla="*/ 4808306 w 10017304"/>
+              <a:gd name="connsiteY1" fmla="*/ 1277 h 1028693"/>
+              <a:gd name="connsiteX2" fmla="*/ 10017304 w 10017304"/>
+              <a:gd name="connsiteY2" fmla="*/ 1028693 h 1028693"/>
+            </a:gdLst>
+            <a:ahLst/>
+            <a:cxnLst>
+              <a:cxn ang="0">
+                <a:pos x="connsiteX0" y="connsiteY0"/>
+              </a:cxn>
+              <a:cxn ang="0">
+                <a:pos x="connsiteX1" y="connsiteY1"/>
+              </a:cxn>
+              <a:cxn ang="0">
+                <a:pos x="connsiteX2" y="connsiteY2"/>
+              </a:cxn>
+            </a:cxnLst>
+            <a:rect l="l" t="t" r="r" b="b"/>
+            <a:pathLst>
+              <a:path w="10017304" h="1028693">
+                <a:moveTo>
+                  <a:pt x="0" y="987596"/>
+                </a:moveTo>
+                <a:cubicBezTo>
+                  <a:pt x="788541" y="573204"/>
+                  <a:pt x="2049695" y="35525"/>
+                  <a:pt x="4808306" y="1277"/>
+                </a:cubicBezTo>
+                <a:cubicBezTo>
+                  <a:pt x="7566917" y="-32971"/>
+                  <a:pt x="9263866" y="629713"/>
+                  <a:pt x="10017304" y="1028693"/>
+                </a:cubicBezTo>
+              </a:path>
+            </a:pathLst>
+          </a:custGeom>
+          <a:noFill/>
+          <a:ln w="28575"/>
+        </p:spPr>
+        <p:style>
+          <a:lnRef idx="2">
+            <a:schemeClr val="accent1">
+              <a:shade val="15000"/>
+            </a:schemeClr>
+          </a:lnRef>
+          <a:fillRef idx="1">
+            <a:schemeClr val="accent1"/>
+          </a:fillRef>
+          <a:effectRef idx="0">
+            <a:schemeClr val="accent1"/>
+          </a:effectRef>
+          <a:fontRef idx="minor">
+            <a:schemeClr val="lt1"/>
+          </a:fontRef>
+        </p:style>
+        <p:txBody>
+          <a:bodyPr rtlCol="0" anchor="ctr"/>
+          <a:lstStyle/>
+          <a:p>
+            <a:pPr algn="ctr"/>
+            <a:endParaRPr lang="en-US"/>
+          </a:p>
+        </p:txBody>
+      </p:sp>
+      <p:pic>
+        <p:nvPicPr>
+          <p:cNvPr id="41" name="Picture 40">
+            <a:extLst>
+              <a:ext uri="{FF2B5EF4-FFF2-40B4-BE49-F238E27FC236}">
+                <a16:creationId xmlns:a16="http://schemas.microsoft.com/office/drawing/2014/main" id="{B8BCD43D-0DD5-DF02-B901-CDB425984BD9}"/>
+              </a:ext>
+            </a:extLst>
+          </p:cNvPr>
+          <p:cNvPicPr>
+            <a:picLocks noChangeAspect="1"/>
+          </p:cNvPicPr>
+          <p:nvPr/>
+        </p:nvPicPr>
+        <p:blipFill rotWithShape="1">
+          <a:blip r:embed="rId2"/>
+          <a:srcRect t="16217" b="16777"/>
+          <a:stretch/>
+        </p:blipFill>
+        <p:spPr>
+          <a:xfrm>
+            <a:off x="3448226" y="1893014"/>
+            <a:ext cx="4389500" cy="3071972"/>
+          </a:xfrm>
+          <a:prstGeom prst="rect">
+            <a:avLst/>
+          </a:prstGeom>
+        </p:spPr>
+      </p:pic>
+      <p:cxnSp>
+        <p:nvCxnSpPr>
+          <p:cNvPr id="7" name="Straight Arrow Connector 6">
+            <a:extLst>
+              <a:ext uri="{FF2B5EF4-FFF2-40B4-BE49-F238E27FC236}">
+                <a16:creationId xmlns:a16="http://schemas.microsoft.com/office/drawing/2014/main" id="{5B03BACD-69A9-F839-D896-C735AB594BC9}"/>
+              </a:ext>
+            </a:extLst>
+          </p:cNvPr>
+          <p:cNvCxnSpPr>
+            <a:cxnSpLocks/>
+          </p:cNvCxnSpPr>
+          <p:nvPr/>
+        </p:nvCxnSpPr>
+        <p:spPr>
+          <a:xfrm flipV="1">
+            <a:off x="5988870" y="2101712"/>
+            <a:ext cx="0" cy="738802"/>
+          </a:xfrm>
+          <a:prstGeom prst="straightConnector1">
+            <a:avLst/>
+          </a:prstGeom>
+          <a:ln w="57150">
+            <a:solidFill>
+              <a:srgbClr val="1122FF"/>
+            </a:solidFill>
+            <a:tailEnd type="triangle"/>
+          </a:ln>
+        </p:spPr>
+        <p:style>
+          <a:lnRef idx="1">
+            <a:schemeClr val="accent1"/>
+          </a:lnRef>
+          <a:fillRef idx="0">
+            <a:schemeClr val="accent1"/>
+          </a:fillRef>
+          <a:effectRef idx="0">
+            <a:schemeClr val="accent1"/>
+          </a:effectRef>
+          <a:fontRef idx="minor">
+            <a:schemeClr val="tx1"/>
+          </a:fontRef>
+        </p:style>
+      </p:cxnSp>
+      <p:cxnSp>
+        <p:nvCxnSpPr>
+          <p:cNvPr id="8" name="Straight Arrow Connector 7">
+            <a:extLst>
+              <a:ext uri="{FF2B5EF4-FFF2-40B4-BE49-F238E27FC236}">
+                <a16:creationId xmlns:a16="http://schemas.microsoft.com/office/drawing/2014/main" id="{F7DEAE03-C87D-BECE-89B3-90EE18D38953}"/>
+              </a:ext>
+            </a:extLst>
+          </p:cNvPr>
+          <p:cNvCxnSpPr>
+            <a:cxnSpLocks/>
+          </p:cNvCxnSpPr>
+          <p:nvPr/>
+        </p:nvCxnSpPr>
+        <p:spPr>
+          <a:xfrm flipH="1">
+            <a:off x="5297083" y="2840514"/>
+            <a:ext cx="691787" cy="0"/>
+          </a:xfrm>
+          <a:prstGeom prst="straightConnector1">
+            <a:avLst/>
+          </a:prstGeom>
+          <a:ln w="57150">
+            <a:solidFill>
+              <a:srgbClr val="C00000"/>
+            </a:solidFill>
+            <a:tailEnd type="triangle"/>
+          </a:ln>
+        </p:spPr>
+        <p:style>
+          <a:lnRef idx="1">
+            <a:schemeClr val="accent1"/>
+          </a:lnRef>
+          <a:fillRef idx="0">
+            <a:schemeClr val="accent1"/>
+          </a:fillRef>
+          <a:effectRef idx="0">
+            <a:schemeClr val="accent1"/>
+          </a:effectRef>
+          <a:fontRef idx="minor">
+            <a:schemeClr val="tx1"/>
+          </a:fontRef>
+        </p:style>
+      </p:cxnSp>
+      <mc:AlternateContent xmlns:mc="http://schemas.openxmlformats.org/markup-compatibility/2006">
+        <mc:Choice xmlns:a14="http://schemas.microsoft.com/office/drawing/2010/main" Requires="a14">
+          <p:sp>
+            <p:nvSpPr>
+              <p:cNvPr id="11" name="TextBox 10">
+                <a:extLst>
+                  <a:ext uri="{FF2B5EF4-FFF2-40B4-BE49-F238E27FC236}">
+                    <a16:creationId xmlns:a16="http://schemas.microsoft.com/office/drawing/2014/main" id="{658C3BC9-1605-3A4C-2BDD-6CDD49928875}"/>
+                  </a:ext>
+                </a:extLst>
+              </p:cNvPr>
+              <p:cNvSpPr txBox="1"/>
+              <p:nvPr/>
+            </p:nvSpPr>
+            <p:spPr>
+              <a:xfrm>
+                <a:off x="5198189" y="2403049"/>
+                <a:ext cx="258404" cy="379206"/>
+              </a:xfrm>
+              <a:prstGeom prst="rect">
+                <a:avLst/>
+              </a:prstGeom>
+              <a:noFill/>
+            </p:spPr>
+            <p:txBody>
+              <a:bodyPr wrap="none" lIns="0" tIns="0" rIns="0" bIns="0" rtlCol="0">
+                <a:spAutoFit/>
+              </a:bodyPr>
+              <a:lstStyle/>
+              <a:p>
+                <a:pPr/>
+                <a14:m>
+                  <m:oMathPara xmlns:m="http://schemas.openxmlformats.org/officeDocument/2006/math">
+                    <m:oMathParaPr>
+                      <m:jc m:val="centerGroup"/>
+                    </m:oMathParaPr>
+                    <m:oMath xmlns:m="http://schemas.openxmlformats.org/officeDocument/2006/math">
+                      <m:acc>
+                        <m:accPr>
+                          <m:chr m:val="̂"/>
+                          <m:ctrlPr>
+                            <a:rPr lang="en-US" sz="2400" i="1" smtClean="0">
+                              <a:latin typeface="Cambria Math" panose="02040503050406030204" pitchFamily="18" charset="0"/>
+                            </a:rPr>
+                          </m:ctrlPr>
+                        </m:accPr>
+                        <m:e>
+                          <m:r>
+                            <a:rPr lang="en-US" sz="2400" b="0" i="1" smtClean="0">
+                              <a:latin typeface="Cambria Math" panose="02040503050406030204" pitchFamily="18" charset="0"/>
+                            </a:rPr>
+                            <m:t>𝑇</m:t>
+                          </m:r>
+                        </m:e>
+                      </m:acc>
+                    </m:oMath>
+                  </m:oMathPara>
+                </a14:m>
+                <a:endParaRPr lang="en-US" sz="2400" dirty="0"/>
+              </a:p>
+            </p:txBody>
+          </p:sp>
+        </mc:Choice>
+        <mc:Fallback>
+          <p:sp>
+            <p:nvSpPr>
+              <p:cNvPr id="11" name="TextBox 10">
+                <a:extLst>
+                  <a:ext uri="{FF2B5EF4-FFF2-40B4-BE49-F238E27FC236}">
+                    <a16:creationId xmlns:a16="http://schemas.microsoft.com/office/drawing/2014/main" id="{658C3BC9-1605-3A4C-2BDD-6CDD49928875}"/>
+                  </a:ext>
+                </a:extLst>
+              </p:cNvPr>
+              <p:cNvSpPr txBox="1">
+                <a:spLocks noRot="1" noChangeAspect="1" noMove="1" noResize="1" noEditPoints="1" noAdjustHandles="1" noChangeArrowheads="1" noChangeShapeType="1" noTextEdit="1"/>
+              </p:cNvSpPr>
+              <p:nvPr/>
+            </p:nvSpPr>
+            <p:spPr>
+              <a:xfrm>
+                <a:off x="5198189" y="2403049"/>
+                <a:ext cx="258404" cy="379206"/>
+              </a:xfrm>
+              <a:prstGeom prst="rect">
+                <a:avLst/>
+              </a:prstGeom>
+              <a:blipFill>
+                <a:blip r:embed="rId3"/>
+                <a:stretch>
+                  <a:fillRect l="-28571" t="-17742" r="-64286" b="-8065"/>
+                </a:stretch>
+              </a:blipFill>
+            </p:spPr>
+            <p:txBody>
+              <a:bodyPr/>
+              <a:lstStyle/>
+              <a:p>
+                <a:r>
+                  <a:rPr lang="en-US">
+                    <a:noFill/>
+                  </a:rPr>
+                  <a:t> </a:t>
+                </a:r>
+              </a:p>
+            </p:txBody>
+          </p:sp>
+        </mc:Fallback>
+      </mc:AlternateContent>
+      <mc:AlternateContent xmlns:mc="http://schemas.openxmlformats.org/markup-compatibility/2006">
+        <mc:Choice xmlns:a14="http://schemas.microsoft.com/office/drawing/2010/main" Requires="a14">
+          <p:sp>
+            <p:nvSpPr>
+              <p:cNvPr id="14" name="TextBox 13">
+                <a:extLst>
+                  <a:ext uri="{FF2B5EF4-FFF2-40B4-BE49-F238E27FC236}">
+                    <a16:creationId xmlns:a16="http://schemas.microsoft.com/office/drawing/2014/main" id="{5E8CB281-9362-D9DD-A86E-CB0DB783BB82}"/>
+                  </a:ext>
+                </a:extLst>
+              </p:cNvPr>
+              <p:cNvSpPr txBox="1"/>
+              <p:nvPr/>
+            </p:nvSpPr>
+            <p:spPr>
+              <a:xfrm>
+                <a:off x="6018235" y="1802540"/>
+                <a:ext cx="273536" cy="379206"/>
+              </a:xfrm>
+              <a:prstGeom prst="rect">
+                <a:avLst/>
+              </a:prstGeom>
+              <a:noFill/>
+            </p:spPr>
+            <p:txBody>
+              <a:bodyPr wrap="none" lIns="0" tIns="0" rIns="0" bIns="0" rtlCol="0">
+                <a:spAutoFit/>
+              </a:bodyPr>
+              <a:lstStyle/>
+              <a:p>
+                <a:pPr/>
+                <a14:m>
+                  <m:oMathPara xmlns:m="http://schemas.openxmlformats.org/officeDocument/2006/math">
+                    <m:oMathParaPr>
+                      <m:jc m:val="centerGroup"/>
+                    </m:oMathParaPr>
+                    <m:oMath xmlns:m="http://schemas.openxmlformats.org/officeDocument/2006/math">
+                      <m:acc>
+                        <m:accPr>
+                          <m:chr m:val="̂"/>
+                          <m:ctrlPr>
+                            <a:rPr lang="en-US" sz="2400" i="1" smtClean="0">
+                              <a:latin typeface="Cambria Math" panose="02040503050406030204" pitchFamily="18" charset="0"/>
+                            </a:rPr>
+                          </m:ctrlPr>
+                        </m:accPr>
+                        <m:e>
+                          <m:r>
+                            <a:rPr lang="en-US" sz="2400" b="0" i="1" smtClean="0">
+                              <a:latin typeface="Cambria Math" panose="02040503050406030204" pitchFamily="18" charset="0"/>
+                            </a:rPr>
+                            <m:t>𝑅</m:t>
+                          </m:r>
+                        </m:e>
+                      </m:acc>
+                    </m:oMath>
+                  </m:oMathPara>
+                </a14:m>
+                <a:endParaRPr lang="en-US" sz="2400" dirty="0"/>
+              </a:p>
+            </p:txBody>
+          </p:sp>
+        </mc:Choice>
+        <mc:Fallback>
+          <p:sp>
+            <p:nvSpPr>
+              <p:cNvPr id="14" name="TextBox 13">
+                <a:extLst>
+                  <a:ext uri="{FF2B5EF4-FFF2-40B4-BE49-F238E27FC236}">
+                    <a16:creationId xmlns:a16="http://schemas.microsoft.com/office/drawing/2014/main" id="{5E8CB281-9362-D9DD-A86E-CB0DB783BB82}"/>
+                  </a:ext>
+                </a:extLst>
+              </p:cNvPr>
+              <p:cNvSpPr txBox="1">
+                <a:spLocks noRot="1" noChangeAspect="1" noMove="1" noResize="1" noEditPoints="1" noAdjustHandles="1" noChangeArrowheads="1" noChangeShapeType="1" noTextEdit="1"/>
+              </p:cNvSpPr>
+              <p:nvPr/>
+            </p:nvSpPr>
+            <p:spPr>
+              <a:xfrm>
+                <a:off x="6018235" y="1802540"/>
+                <a:ext cx="273536" cy="379206"/>
+              </a:xfrm>
+              <a:prstGeom prst="rect">
+                <a:avLst/>
+              </a:prstGeom>
+              <a:blipFill>
+                <a:blip r:embed="rId4"/>
+                <a:stretch>
+                  <a:fillRect l="-24444" t="-19355" r="-68889" b="-6452"/>
+                </a:stretch>
+              </a:blipFill>
+            </p:spPr>
+            <p:txBody>
+              <a:bodyPr/>
+              <a:lstStyle/>
+              <a:p>
+                <a:r>
+                  <a:rPr lang="en-US">
+                    <a:noFill/>
+                  </a:rPr>
+                  <a:t> </a:t>
+                </a:r>
+              </a:p>
+            </p:txBody>
+          </p:sp>
+        </mc:Fallback>
+      </mc:AlternateContent>
+      <mc:AlternateContent xmlns:mc="http://schemas.openxmlformats.org/markup-compatibility/2006">
+        <mc:Choice xmlns:a14="http://schemas.microsoft.com/office/drawing/2010/main" Requires="a14">
+          <p:sp>
+            <p:nvSpPr>
+              <p:cNvPr id="15" name="TextBox 14">
+                <a:extLst>
+                  <a:ext uri="{FF2B5EF4-FFF2-40B4-BE49-F238E27FC236}">
+                    <a16:creationId xmlns:a16="http://schemas.microsoft.com/office/drawing/2014/main" id="{8C9A919A-4930-99C9-E436-310B42FB374D}"/>
+                  </a:ext>
+                </a:extLst>
+              </p:cNvPr>
+              <p:cNvSpPr txBox="1"/>
+              <p:nvPr/>
+            </p:nvSpPr>
+            <p:spPr>
+              <a:xfrm>
+                <a:off x="5872249" y="2980490"/>
+                <a:ext cx="302455" cy="379206"/>
+              </a:xfrm>
+              <a:prstGeom prst="rect">
+                <a:avLst/>
+              </a:prstGeom>
+              <a:noFill/>
+            </p:spPr>
+            <p:txBody>
+              <a:bodyPr wrap="none" lIns="0" tIns="0" rIns="0" bIns="0" rtlCol="0">
+                <a:spAutoFit/>
+              </a:bodyPr>
+              <a:lstStyle/>
+              <a:p>
+                <a:pPr/>
+                <a14:m>
+                  <m:oMathPara xmlns:m="http://schemas.openxmlformats.org/officeDocument/2006/math">
+                    <m:oMathParaPr>
+                      <m:jc m:val="centerGroup"/>
+                    </m:oMathParaPr>
+                    <m:oMath xmlns:m="http://schemas.openxmlformats.org/officeDocument/2006/math">
+                      <m:acc>
+                        <m:accPr>
+                          <m:chr m:val="̂"/>
+                          <m:ctrlPr>
+                            <a:rPr lang="en-US" sz="2400" i="1" smtClean="0">
+                              <a:latin typeface="Cambria Math" panose="02040503050406030204" pitchFamily="18" charset="0"/>
+                            </a:rPr>
+                          </m:ctrlPr>
+                        </m:accPr>
+                        <m:e>
+                          <m:r>
+                            <a:rPr lang="en-US" sz="2400" b="0" i="1" smtClean="0">
+                              <a:latin typeface="Cambria Math" panose="02040503050406030204" pitchFamily="18" charset="0"/>
+                            </a:rPr>
+                            <m:t>𝑁</m:t>
+                          </m:r>
+                        </m:e>
+                      </m:acc>
+                    </m:oMath>
+                  </m:oMathPara>
+                </a14:m>
+                <a:endParaRPr lang="en-US" sz="2400" dirty="0"/>
+              </a:p>
+            </p:txBody>
+          </p:sp>
+        </mc:Choice>
+        <mc:Fallback>
+          <p:sp>
+            <p:nvSpPr>
+              <p:cNvPr id="15" name="TextBox 14">
+                <a:extLst>
+                  <a:ext uri="{FF2B5EF4-FFF2-40B4-BE49-F238E27FC236}">
+                    <a16:creationId xmlns:a16="http://schemas.microsoft.com/office/drawing/2014/main" id="{8C9A919A-4930-99C9-E436-310B42FB374D}"/>
+                  </a:ext>
+                </a:extLst>
+              </p:cNvPr>
+              <p:cNvSpPr txBox="1">
+                <a:spLocks noRot="1" noChangeAspect="1" noMove="1" noResize="1" noEditPoints="1" noAdjustHandles="1" noChangeArrowheads="1" noChangeShapeType="1" noTextEdit="1"/>
+              </p:cNvSpPr>
+              <p:nvPr/>
+            </p:nvSpPr>
+            <p:spPr>
+              <a:xfrm>
+                <a:off x="5872249" y="2980490"/>
+                <a:ext cx="302455" cy="379206"/>
+              </a:xfrm>
+              <a:prstGeom prst="rect">
+                <a:avLst/>
+              </a:prstGeom>
+              <a:blipFill>
+                <a:blip r:embed="rId5"/>
+                <a:stretch>
+                  <a:fillRect l="-22000" t="-19355" r="-56000" b="-6452"/>
+                </a:stretch>
+              </a:blipFill>
+            </p:spPr>
+            <p:txBody>
+              <a:bodyPr/>
+              <a:lstStyle/>
+              <a:p>
+                <a:r>
+                  <a:rPr lang="en-US">
+                    <a:noFill/>
+                  </a:rPr>
+                  <a:t> </a:t>
+                </a:r>
+              </a:p>
+            </p:txBody>
+          </p:sp>
+        </mc:Fallback>
+      </mc:AlternateContent>
+      <p:cxnSp>
+        <p:nvCxnSpPr>
+          <p:cNvPr id="6" name="Straight Arrow Connector 5">
+            <a:extLst>
+              <a:ext uri="{FF2B5EF4-FFF2-40B4-BE49-F238E27FC236}">
+                <a16:creationId xmlns:a16="http://schemas.microsoft.com/office/drawing/2014/main" id="{E99BAAF9-B41B-599D-E936-607E44654CAA}"/>
+              </a:ext>
+            </a:extLst>
+          </p:cNvPr>
+          <p:cNvCxnSpPr>
+            <a:cxnSpLocks/>
+          </p:cNvCxnSpPr>
+          <p:nvPr/>
+        </p:nvCxnSpPr>
+        <p:spPr>
+          <a:xfrm flipV="1">
+            <a:off x="5988870" y="2170450"/>
+            <a:ext cx="864897" cy="673047"/>
+          </a:xfrm>
+          <a:prstGeom prst="straightConnector1">
+            <a:avLst/>
+          </a:prstGeom>
+          <a:ln w="57150">
+            <a:solidFill>
+              <a:srgbClr val="00B0F0"/>
+            </a:solidFill>
+            <a:tailEnd type="triangle"/>
+          </a:ln>
+        </p:spPr>
+        <p:style>
+          <a:lnRef idx="1">
+            <a:schemeClr val="accent1"/>
+          </a:lnRef>
+          <a:fillRef idx="0">
+            <a:schemeClr val="accent1"/>
+          </a:fillRef>
+          <a:effectRef idx="0">
+            <a:schemeClr val="accent1"/>
+          </a:effectRef>
+          <a:fontRef idx="minor">
+            <a:schemeClr val="tx1"/>
+          </a:fontRef>
+        </p:style>
+      </p:cxnSp>
+      <p:cxnSp>
+        <p:nvCxnSpPr>
+          <p:cNvPr id="12" name="Straight Arrow Connector 11">
+            <a:extLst>
+              <a:ext uri="{FF2B5EF4-FFF2-40B4-BE49-F238E27FC236}">
+                <a16:creationId xmlns:a16="http://schemas.microsoft.com/office/drawing/2014/main" id="{6B130A60-4C2E-7869-7D8A-549F0E53CF8D}"/>
+              </a:ext>
+            </a:extLst>
+          </p:cNvPr>
+          <p:cNvCxnSpPr>
+            <a:cxnSpLocks/>
+          </p:cNvCxnSpPr>
+          <p:nvPr/>
+        </p:nvCxnSpPr>
+        <p:spPr>
+          <a:xfrm flipH="1" flipV="1">
+            <a:off x="5311105" y="2039194"/>
+            <a:ext cx="677765" cy="825447"/>
+          </a:xfrm>
+          <a:prstGeom prst="straightConnector1">
+            <a:avLst/>
+          </a:prstGeom>
+          <a:ln w="57150">
+            <a:solidFill>
+              <a:srgbClr val="FF01BC"/>
+            </a:solidFill>
+            <a:tailEnd type="triangle"/>
+          </a:ln>
+        </p:spPr>
+        <p:style>
+          <a:lnRef idx="1">
+            <a:schemeClr val="accent1"/>
+          </a:lnRef>
+          <a:fillRef idx="0">
+            <a:schemeClr val="accent1"/>
+          </a:fillRef>
+          <a:effectRef idx="0">
+            <a:schemeClr val="accent1"/>
+          </a:effectRef>
+          <a:fontRef idx="minor">
+            <a:schemeClr val="tx1"/>
+          </a:fontRef>
+        </p:style>
+      </p:cxnSp>
+      <mc:AlternateContent xmlns:mc="http://schemas.openxmlformats.org/markup-compatibility/2006">
+        <mc:Choice xmlns:a14="http://schemas.microsoft.com/office/drawing/2010/main" Requires="a14">
+          <p:sp>
+            <p:nvSpPr>
+              <p:cNvPr id="19" name="TextBox 18">
+                <a:extLst>
+                  <a:ext uri="{FF2B5EF4-FFF2-40B4-BE49-F238E27FC236}">
+                    <a16:creationId xmlns:a16="http://schemas.microsoft.com/office/drawing/2014/main" id="{A223DE0C-A2F4-6857-2ADE-1C6918D469B0}"/>
+                  </a:ext>
+                </a:extLst>
+              </p:cNvPr>
+              <p:cNvSpPr txBox="1"/>
+              <p:nvPr/>
+            </p:nvSpPr>
+            <p:spPr>
+              <a:xfrm>
+                <a:off x="6905560" y="2004511"/>
+                <a:ext cx="301941" cy="276999"/>
+              </a:xfrm>
+              <a:prstGeom prst="rect">
+                <a:avLst/>
+              </a:prstGeom>
+              <a:noFill/>
+            </p:spPr>
+            <p:txBody>
+              <a:bodyPr wrap="none" lIns="0" tIns="0" rIns="0" bIns="0" rtlCol="0">
+                <a:spAutoFit/>
+              </a:bodyPr>
+              <a:lstStyle/>
+              <a:p>
+                <a14:m>
+                  <m:oMathPara xmlns:m="http://schemas.openxmlformats.org/officeDocument/2006/math">
+                    <m:oMathParaPr>
+                      <m:jc m:val="centerGroup"/>
+                    </m:oMathParaPr>
+                    <m:oMath xmlns:m="http://schemas.openxmlformats.org/officeDocument/2006/math">
+                      <m:sSub>
+                        <m:sSubPr>
+                          <m:ctrlPr>
+                            <a:rPr lang="en-US" i="1">
+                              <a:latin typeface="Cambria Math" panose="02040503050406030204" pitchFamily="18" charset="0"/>
+                            </a:rPr>
+                          </m:ctrlPr>
+                        </m:sSubPr>
+                        <m:e>
+                          <m:acc>
+                            <m:accPr>
+                              <m:chr m:val="̂"/>
+                              <m:ctrlPr>
+                                <a:rPr lang="en-US" i="1">
+                                  <a:latin typeface="Cambria Math" panose="02040503050406030204" pitchFamily="18" charset="0"/>
+                                </a:rPr>
+                              </m:ctrlPr>
+                            </m:accPr>
+                            <m:e>
+                              <m:r>
+                                <a:rPr lang="en-US" i="1">
+                                  <a:latin typeface="Cambria Math" panose="02040503050406030204" pitchFamily="18" charset="0"/>
+                                </a:rPr>
+                                <m:t>𝑥</m:t>
+                              </m:r>
+                            </m:e>
+                          </m:acc>
+                        </m:e>
+                        <m:sub>
+                          <m:r>
+                            <a:rPr lang="en-US" i="1">
+                              <a:latin typeface="Cambria Math" panose="02040503050406030204" pitchFamily="18" charset="0"/>
+                            </a:rPr>
+                            <m:t>𝐵</m:t>
+                          </m:r>
+                        </m:sub>
+                      </m:sSub>
+                    </m:oMath>
+                  </m:oMathPara>
+                </a14:m>
+                <a:endParaRPr lang="en-US" dirty="0"/>
+              </a:p>
+            </p:txBody>
+          </p:sp>
+        </mc:Choice>
+        <mc:Fallback>
+          <p:sp>
+            <p:nvSpPr>
+              <p:cNvPr id="19" name="TextBox 18">
+                <a:extLst>
+                  <a:ext uri="{FF2B5EF4-FFF2-40B4-BE49-F238E27FC236}">
+                    <a16:creationId xmlns:a16="http://schemas.microsoft.com/office/drawing/2014/main" id="{A223DE0C-A2F4-6857-2ADE-1C6918D469B0}"/>
+                  </a:ext>
+                </a:extLst>
+              </p:cNvPr>
+              <p:cNvSpPr txBox="1">
+                <a:spLocks noRot="1" noChangeAspect="1" noMove="1" noResize="1" noEditPoints="1" noAdjustHandles="1" noChangeArrowheads="1" noChangeShapeType="1" noTextEdit="1"/>
+              </p:cNvSpPr>
+              <p:nvPr/>
+            </p:nvSpPr>
+            <p:spPr>
+              <a:xfrm>
+                <a:off x="6905560" y="2004511"/>
+                <a:ext cx="301941" cy="276999"/>
+              </a:xfrm>
+              <a:prstGeom prst="rect">
+                <a:avLst/>
+              </a:prstGeom>
+              <a:blipFill>
+                <a:blip r:embed="rId6"/>
+                <a:stretch>
+                  <a:fillRect l="-10204" t="-26667" r="-48980" b="-15556"/>
+                </a:stretch>
+              </a:blipFill>
+            </p:spPr>
+            <p:txBody>
+              <a:bodyPr/>
+              <a:lstStyle/>
+              <a:p>
+                <a:r>
+                  <a:rPr lang="en-US">
+                    <a:noFill/>
+                  </a:rPr>
+                  <a:t> </a:t>
+                </a:r>
+              </a:p>
+            </p:txBody>
+          </p:sp>
+        </mc:Fallback>
+      </mc:AlternateContent>
+      <mc:AlternateContent xmlns:mc="http://schemas.openxmlformats.org/markup-compatibility/2006">
+        <mc:Choice xmlns:a14="http://schemas.microsoft.com/office/drawing/2010/main" Requires="a14">
+          <p:sp>
+            <p:nvSpPr>
+              <p:cNvPr id="20" name="TextBox 19">
+                <a:extLst>
+                  <a:ext uri="{FF2B5EF4-FFF2-40B4-BE49-F238E27FC236}">
+                    <a16:creationId xmlns:a16="http://schemas.microsoft.com/office/drawing/2014/main" id="{A64EB471-59C7-3A0B-DFC6-B89A0F326606}"/>
+                  </a:ext>
+                </a:extLst>
+              </p:cNvPr>
+              <p:cNvSpPr txBox="1"/>
+              <p:nvPr/>
+            </p:nvSpPr>
+            <p:spPr>
+              <a:xfrm>
+                <a:off x="5191060" y="1717914"/>
+                <a:ext cx="303609" cy="276999"/>
+              </a:xfrm>
+              <a:prstGeom prst="rect">
+                <a:avLst/>
+              </a:prstGeom>
+              <a:noFill/>
+            </p:spPr>
+            <p:txBody>
+              <a:bodyPr wrap="none" lIns="0" tIns="0" rIns="0" bIns="0" rtlCol="0">
+                <a:spAutoFit/>
+              </a:bodyPr>
+              <a:lstStyle/>
+              <a:p>
+                <a14:m>
+                  <m:oMathPara xmlns:m="http://schemas.openxmlformats.org/officeDocument/2006/math">
+                    <m:oMathParaPr>
+                      <m:jc m:val="centerGroup"/>
+                    </m:oMathParaPr>
+                    <m:oMath xmlns:m="http://schemas.openxmlformats.org/officeDocument/2006/math">
+                      <m:sSub>
+                        <m:sSubPr>
+                          <m:ctrlPr>
+                            <a:rPr lang="en-US" i="1" smtClean="0">
+                              <a:latin typeface="Cambria Math" panose="02040503050406030204" pitchFamily="18" charset="0"/>
+                            </a:rPr>
+                          </m:ctrlPr>
+                        </m:sSubPr>
+                        <m:e>
+                          <m:acc>
+                            <m:accPr>
+                              <m:chr m:val="̂"/>
+                              <m:ctrlPr>
+                                <a:rPr lang="en-US" i="1">
+                                  <a:latin typeface="Cambria Math" panose="02040503050406030204" pitchFamily="18" charset="0"/>
+                                </a:rPr>
+                              </m:ctrlPr>
+                            </m:accPr>
+                            <m:e>
+                              <m:r>
+                                <a:rPr lang="en-US" b="0" i="1" smtClean="0">
+                                  <a:latin typeface="Cambria Math" panose="02040503050406030204" pitchFamily="18" charset="0"/>
+                                </a:rPr>
+                                <m:t>𝑦</m:t>
+                              </m:r>
+                            </m:e>
+                          </m:acc>
+                        </m:e>
+                        <m:sub>
+                          <m:r>
+                            <a:rPr lang="en-US" i="1">
+                              <a:latin typeface="Cambria Math" panose="02040503050406030204" pitchFamily="18" charset="0"/>
+                            </a:rPr>
+                            <m:t>𝐵</m:t>
+                          </m:r>
+                        </m:sub>
+                      </m:sSub>
+                    </m:oMath>
+                  </m:oMathPara>
+                </a14:m>
+                <a:endParaRPr lang="en-US" dirty="0"/>
+              </a:p>
+            </p:txBody>
+          </p:sp>
+        </mc:Choice>
+        <mc:Fallback>
+          <p:sp>
+            <p:nvSpPr>
+              <p:cNvPr id="20" name="TextBox 19">
+                <a:extLst>
+                  <a:ext uri="{FF2B5EF4-FFF2-40B4-BE49-F238E27FC236}">
+                    <a16:creationId xmlns:a16="http://schemas.microsoft.com/office/drawing/2014/main" id="{A64EB471-59C7-3A0B-DFC6-B89A0F326606}"/>
+                  </a:ext>
+                </a:extLst>
+              </p:cNvPr>
+              <p:cNvSpPr txBox="1">
+                <a:spLocks noRot="1" noChangeAspect="1" noMove="1" noResize="1" noEditPoints="1" noAdjustHandles="1" noChangeArrowheads="1" noChangeShapeType="1" noTextEdit="1"/>
+              </p:cNvSpPr>
+              <p:nvPr/>
+            </p:nvSpPr>
+            <p:spPr>
+              <a:xfrm>
+                <a:off x="5191060" y="1717914"/>
+                <a:ext cx="303609" cy="276999"/>
+              </a:xfrm>
+              <a:prstGeom prst="rect">
+                <a:avLst/>
+              </a:prstGeom>
+              <a:blipFill>
+                <a:blip r:embed="rId7"/>
+                <a:stretch>
+                  <a:fillRect l="-18367" t="-26667" r="-51020" b="-26667"/>
+                </a:stretch>
+              </a:blipFill>
+            </p:spPr>
+            <p:txBody>
+              <a:bodyPr/>
+              <a:lstStyle/>
+              <a:p>
+                <a:r>
+                  <a:rPr lang="en-US">
+                    <a:noFill/>
+                  </a:rPr>
+                  <a:t> </a:t>
+                </a:r>
+              </a:p>
+            </p:txBody>
+          </p:sp>
+        </mc:Fallback>
+      </mc:AlternateContent>
+      <p:cxnSp>
+        <p:nvCxnSpPr>
+          <p:cNvPr id="22" name="Straight Connector 21">
+            <a:extLst>
+              <a:ext uri="{FF2B5EF4-FFF2-40B4-BE49-F238E27FC236}">
+                <a16:creationId xmlns:a16="http://schemas.microsoft.com/office/drawing/2014/main" id="{04E1E375-192F-346D-213C-6291FA073E92}"/>
+              </a:ext>
+            </a:extLst>
+          </p:cNvPr>
+          <p:cNvCxnSpPr>
+            <a:cxnSpLocks/>
+          </p:cNvCxnSpPr>
+          <p:nvPr/>
+        </p:nvCxnSpPr>
+        <p:spPr>
+          <a:xfrm flipV="1">
+            <a:off x="6096000" y="2840513"/>
+            <a:ext cx="2238375" cy="1"/>
+          </a:xfrm>
+          <a:prstGeom prst="line">
+            <a:avLst/>
+          </a:prstGeom>
+          <a:ln w="19050">
+            <a:prstDash val="dash"/>
+          </a:ln>
+        </p:spPr>
+        <p:style>
+          <a:lnRef idx="1">
+            <a:schemeClr val="dk1"/>
+          </a:lnRef>
+          <a:fillRef idx="0">
+            <a:schemeClr val="dk1"/>
+          </a:fillRef>
+          <a:effectRef idx="0">
+            <a:schemeClr val="dk1"/>
+          </a:effectRef>
+          <a:fontRef idx="minor">
+            <a:schemeClr val="tx1"/>
+          </a:fontRef>
+        </p:style>
+      </p:cxnSp>
+      <p:sp>
+        <p:nvSpPr>
+          <p:cNvPr id="23" name="Partial Circle 22">
+            <a:extLst>
+              <a:ext uri="{FF2B5EF4-FFF2-40B4-BE49-F238E27FC236}">
+                <a16:creationId xmlns:a16="http://schemas.microsoft.com/office/drawing/2014/main" id="{0A78A936-2255-7B79-AA5B-1C0047795E8D}"/>
+              </a:ext>
+            </a:extLst>
+          </p:cNvPr>
+          <p:cNvSpPr/>
+          <p:nvPr/>
+        </p:nvSpPr>
+        <p:spPr>
+          <a:xfrm>
+            <a:off x="5434860" y="2260606"/>
+            <a:ext cx="1159814" cy="1159814"/>
+          </a:xfrm>
+          <a:prstGeom prst="pie">
+            <a:avLst>
+              <a:gd name="adj1" fmla="val 19291880"/>
+              <a:gd name="adj2" fmla="val 21548400"/>
+            </a:avLst>
+          </a:prstGeom>
+          <a:solidFill>
+            <a:srgbClr val="FF01BC">
+              <a:alpha val="25000"/>
+            </a:srgbClr>
+          </a:solidFill>
+          <a:ln>
+            <a:noFill/>
+          </a:ln>
+        </p:spPr>
+        <p:style>
+          <a:lnRef idx="2">
+            <a:schemeClr val="accent1">
+              <a:shade val="15000"/>
+            </a:schemeClr>
+          </a:lnRef>
+          <a:fillRef idx="1">
+            <a:schemeClr val="accent1"/>
+          </a:fillRef>
+          <a:effectRef idx="0">
+            <a:schemeClr val="accent1"/>
+          </a:effectRef>
+          <a:fontRef idx="minor">
+            <a:schemeClr val="lt1"/>
+          </a:fontRef>
+        </p:style>
+        <p:txBody>
+          <a:bodyPr rtlCol="0" anchor="ctr"/>
+          <a:lstStyle/>
+          <a:p>
+            <a:pPr algn="ctr"/>
+            <a:endParaRPr lang="en-US">
+              <a:solidFill>
+                <a:schemeClr val="tx1"/>
+              </a:solidFill>
+            </a:endParaRPr>
+          </a:p>
+        </p:txBody>
+      </p:sp>
+      <mc:AlternateContent xmlns:mc="http://schemas.openxmlformats.org/markup-compatibility/2006">
+        <mc:Choice xmlns:a14="http://schemas.microsoft.com/office/drawing/2010/main" Requires="a14">
+          <p:sp>
+            <p:nvSpPr>
+              <p:cNvPr id="24" name="TextBox 23">
+                <a:extLst>
+                  <a:ext uri="{FF2B5EF4-FFF2-40B4-BE49-F238E27FC236}">
+                    <a16:creationId xmlns:a16="http://schemas.microsoft.com/office/drawing/2014/main" id="{C3932D8A-9862-59AC-4136-4326A7826EFC}"/>
+                  </a:ext>
+                </a:extLst>
+              </p:cNvPr>
+              <p:cNvSpPr txBox="1"/>
+              <p:nvPr/>
+            </p:nvSpPr>
+            <p:spPr>
+              <a:xfrm>
+                <a:off x="6619516" y="2505256"/>
+                <a:ext cx="422039" cy="276999"/>
+              </a:xfrm>
+              <a:prstGeom prst="rect">
+                <a:avLst/>
+              </a:prstGeom>
+              <a:noFill/>
+            </p:spPr>
+            <p:txBody>
+              <a:bodyPr wrap="none" lIns="0" tIns="0" rIns="0" bIns="0" rtlCol="0">
+                <a:spAutoFit/>
+              </a:bodyPr>
+              <a:lstStyle/>
+              <a:p>
+                <a14:m>
+                  <m:oMathPara xmlns:m="http://schemas.openxmlformats.org/officeDocument/2006/math">
+                    <m:oMathParaPr>
+                      <m:jc m:val="centerGroup"/>
+                    </m:oMathParaPr>
+                    <m:oMath xmlns:m="http://schemas.openxmlformats.org/officeDocument/2006/math">
+                      <m:sSup>
+                        <m:sSupPr>
+                          <m:ctrlPr>
+                            <a:rPr lang="en-US" i="1" smtClean="0">
+                              <a:latin typeface="Cambria Math" panose="02040503050406030204" pitchFamily="18" charset="0"/>
+                            </a:rPr>
+                          </m:ctrlPr>
+                        </m:sSupPr>
+                        <m:e>
+                          <m:r>
+                            <a:rPr lang="en-US" b="0" i="1" smtClean="0">
+                              <a:latin typeface="Cambria Math" panose="02040503050406030204" pitchFamily="18" charset="0"/>
+                            </a:rPr>
+                            <m:t>45</m:t>
+                          </m:r>
+                        </m:e>
+                        <m:sup>
+                          <m:r>
+                            <a:rPr lang="en-US" b="0" i="1" smtClean="0">
+                              <a:latin typeface="Cambria Math" panose="02040503050406030204" pitchFamily="18" charset="0"/>
+                            </a:rPr>
+                            <m:t>𝑜</m:t>
+                          </m:r>
+                        </m:sup>
+                      </m:sSup>
+                    </m:oMath>
+                  </m:oMathPara>
+                </a14:m>
+                <a:endParaRPr lang="en-US" dirty="0"/>
+              </a:p>
+            </p:txBody>
+          </p:sp>
+        </mc:Choice>
+        <mc:Fallback>
+          <p:sp>
+            <p:nvSpPr>
+              <p:cNvPr id="24" name="TextBox 23">
+                <a:extLst>
+                  <a:ext uri="{FF2B5EF4-FFF2-40B4-BE49-F238E27FC236}">
+                    <a16:creationId xmlns:a16="http://schemas.microsoft.com/office/drawing/2014/main" id="{C3932D8A-9862-59AC-4136-4326A7826EFC}"/>
+                  </a:ext>
+                </a:extLst>
+              </p:cNvPr>
+              <p:cNvSpPr txBox="1">
+                <a:spLocks noRot="1" noChangeAspect="1" noMove="1" noResize="1" noEditPoints="1" noAdjustHandles="1" noChangeArrowheads="1" noChangeShapeType="1" noTextEdit="1"/>
+              </p:cNvSpPr>
+              <p:nvPr/>
+            </p:nvSpPr>
+            <p:spPr>
+              <a:xfrm>
+                <a:off x="6619516" y="2505256"/>
+                <a:ext cx="422039" cy="276999"/>
+              </a:xfrm>
+              <a:prstGeom prst="rect">
+                <a:avLst/>
+              </a:prstGeom>
+              <a:blipFill>
+                <a:blip r:embed="rId8"/>
+                <a:stretch>
+                  <a:fillRect l="-13043" r="-1449" b="-8889"/>
+                </a:stretch>
+              </a:blipFill>
+            </p:spPr>
+            <p:txBody>
+              <a:bodyPr/>
+              <a:lstStyle/>
+              <a:p>
+                <a:r>
+                  <a:rPr lang="en-US">
+                    <a:noFill/>
+                  </a:rPr>
+                  <a:t> </a:t>
+                </a:r>
+              </a:p>
+            </p:txBody>
+          </p:sp>
+        </mc:Fallback>
+      </mc:AlternateContent>
+      <p:cxnSp>
+        <p:nvCxnSpPr>
+          <p:cNvPr id="26" name="Straight Connector 25">
+            <a:extLst>
+              <a:ext uri="{FF2B5EF4-FFF2-40B4-BE49-F238E27FC236}">
+                <a16:creationId xmlns:a16="http://schemas.microsoft.com/office/drawing/2014/main" id="{E407CC89-669F-C599-70FF-5588652724E2}"/>
+              </a:ext>
+            </a:extLst>
+          </p:cNvPr>
+          <p:cNvCxnSpPr>
+            <a:cxnSpLocks/>
+          </p:cNvCxnSpPr>
+          <p:nvPr/>
+        </p:nvCxnSpPr>
+        <p:spPr>
+          <a:xfrm>
+            <a:off x="6011181" y="2855328"/>
+            <a:ext cx="2123331" cy="680941"/>
+          </a:xfrm>
+          <a:prstGeom prst="line">
+            <a:avLst/>
+          </a:prstGeom>
+          <a:ln w="19050">
+            <a:prstDash val="dash"/>
+          </a:ln>
+        </p:spPr>
+        <p:style>
+          <a:lnRef idx="1">
+            <a:schemeClr val="dk1"/>
+          </a:lnRef>
+          <a:fillRef idx="0">
+            <a:schemeClr val="dk1"/>
+          </a:fillRef>
+          <a:effectRef idx="0">
+            <a:schemeClr val="dk1"/>
+          </a:effectRef>
+          <a:fontRef idx="minor">
+            <a:schemeClr val="tx1"/>
+          </a:fontRef>
+        </p:style>
+      </p:cxnSp>
+      <p:sp>
+        <p:nvSpPr>
+          <p:cNvPr id="35" name="Partial Circle 34">
+            <a:extLst>
+              <a:ext uri="{FF2B5EF4-FFF2-40B4-BE49-F238E27FC236}">
+                <a16:creationId xmlns:a16="http://schemas.microsoft.com/office/drawing/2014/main" id="{5DFF5AEB-56FC-8C83-2B7B-A4CCEAC251F9}"/>
+              </a:ext>
+            </a:extLst>
+          </p:cNvPr>
+          <p:cNvSpPr/>
+          <p:nvPr/>
+        </p:nvSpPr>
+        <p:spPr>
+          <a:xfrm>
+            <a:off x="5417996" y="2261832"/>
+            <a:ext cx="1159814" cy="1159814"/>
+          </a:xfrm>
+          <a:prstGeom prst="pie">
+            <a:avLst>
+              <a:gd name="adj1" fmla="val 21589350"/>
+              <a:gd name="adj2" fmla="val 1155398"/>
+            </a:avLst>
+          </a:prstGeom>
+          <a:solidFill>
+            <a:srgbClr val="37FF91">
+              <a:alpha val="25000"/>
+            </a:srgbClr>
+          </a:solidFill>
+          <a:ln>
+            <a:noFill/>
+          </a:ln>
+        </p:spPr>
+        <p:style>
+          <a:lnRef idx="2">
+            <a:schemeClr val="accent1">
+              <a:shade val="15000"/>
+            </a:schemeClr>
+          </a:lnRef>
+          <a:fillRef idx="1">
+            <a:schemeClr val="accent1"/>
+          </a:fillRef>
+          <a:effectRef idx="0">
+            <a:schemeClr val="accent1"/>
+          </a:effectRef>
+          <a:fontRef idx="minor">
+            <a:schemeClr val="lt1"/>
+          </a:fontRef>
+        </p:style>
+        <p:txBody>
+          <a:bodyPr rtlCol="0" anchor="ctr"/>
+          <a:lstStyle/>
+          <a:p>
+            <a:pPr algn="ctr"/>
+            <a:endParaRPr lang="en-US">
+              <a:solidFill>
+                <a:schemeClr val="tx1"/>
+              </a:solidFill>
+            </a:endParaRPr>
+          </a:p>
+        </p:txBody>
+      </p:sp>
+      <p:cxnSp>
+        <p:nvCxnSpPr>
+          <p:cNvPr id="29" name="Straight Arrow Connector 28">
+            <a:extLst>
+              <a:ext uri="{FF2B5EF4-FFF2-40B4-BE49-F238E27FC236}">
+                <a16:creationId xmlns:a16="http://schemas.microsoft.com/office/drawing/2014/main" id="{B71FA46E-A822-178E-5BF2-90352479BC84}"/>
+              </a:ext>
+            </a:extLst>
+          </p:cNvPr>
+          <p:cNvCxnSpPr>
+            <a:cxnSpLocks/>
+          </p:cNvCxnSpPr>
+          <p:nvPr/>
+        </p:nvCxnSpPr>
+        <p:spPr>
+          <a:xfrm>
+            <a:off x="5988869" y="2842441"/>
+            <a:ext cx="1197961" cy="391232"/>
+          </a:xfrm>
+          <a:prstGeom prst="straightConnector1">
+            <a:avLst/>
+          </a:prstGeom>
+          <a:ln w="57150">
+            <a:solidFill>
+              <a:schemeClr val="accent6">
+                <a:lumMod val="75000"/>
+              </a:schemeClr>
+            </a:solidFill>
+            <a:tailEnd type="triangle"/>
+          </a:ln>
+        </p:spPr>
+        <p:style>
+          <a:lnRef idx="1">
+            <a:schemeClr val="accent1"/>
+          </a:lnRef>
+          <a:fillRef idx="0">
+            <a:schemeClr val="accent1"/>
+          </a:fillRef>
+          <a:effectRef idx="0">
+            <a:schemeClr val="accent1"/>
+          </a:effectRef>
+          <a:fontRef idx="minor">
+            <a:schemeClr val="tx1"/>
+          </a:fontRef>
+        </p:style>
+      </p:cxnSp>
+      <p:sp>
+        <p:nvSpPr>
+          <p:cNvPr id="31" name="Oval 30">
+            <a:extLst>
+              <a:ext uri="{FF2B5EF4-FFF2-40B4-BE49-F238E27FC236}">
+                <a16:creationId xmlns:a16="http://schemas.microsoft.com/office/drawing/2014/main" id="{06486212-9612-C7E6-F322-6B8A5E32CC52}"/>
+              </a:ext>
+            </a:extLst>
+          </p:cNvPr>
+          <p:cNvSpPr/>
+          <p:nvPr/>
+        </p:nvSpPr>
+        <p:spPr>
+          <a:xfrm>
+            <a:off x="5881741" y="2724664"/>
+            <a:ext cx="214259" cy="214259"/>
+          </a:xfrm>
+          <a:prstGeom prst="ellipse">
+            <a:avLst/>
+          </a:prstGeom>
+          <a:solidFill>
+            <a:srgbClr val="00B050"/>
+          </a:solidFill>
+          <a:ln w="28575">
+            <a:solidFill>
+              <a:schemeClr val="bg1"/>
+            </a:solidFill>
+          </a:ln>
+        </p:spPr>
+        <p:style>
+          <a:lnRef idx="2">
+            <a:schemeClr val="accent1">
+              <a:shade val="15000"/>
+            </a:schemeClr>
+          </a:lnRef>
+          <a:fillRef idx="1">
+            <a:schemeClr val="accent1"/>
+          </a:fillRef>
+          <a:effectRef idx="0">
+            <a:schemeClr val="accent1"/>
+          </a:effectRef>
+          <a:fontRef idx="minor">
+            <a:schemeClr val="lt1"/>
+          </a:fontRef>
+        </p:style>
+        <p:txBody>
+          <a:bodyPr rtlCol="0" anchor="ctr"/>
+          <a:lstStyle/>
+          <a:p>
+            <a:pPr algn="ctr"/>
+            <a:endParaRPr lang="en-US"/>
+          </a:p>
+        </p:txBody>
+      </p:sp>
+      <mc:AlternateContent xmlns:mc="http://schemas.openxmlformats.org/markup-compatibility/2006">
+        <mc:Choice xmlns:a14="http://schemas.microsoft.com/office/drawing/2010/main" Requires="a14">
+          <p:sp>
+            <p:nvSpPr>
+              <p:cNvPr id="37" name="TextBox 36">
+                <a:extLst>
+                  <a:ext uri="{FF2B5EF4-FFF2-40B4-BE49-F238E27FC236}">
+                    <a16:creationId xmlns:a16="http://schemas.microsoft.com/office/drawing/2014/main" id="{A1CECEE8-F115-705B-83D6-A2BEAD576B0F}"/>
+                  </a:ext>
+                </a:extLst>
+              </p:cNvPr>
+              <p:cNvSpPr txBox="1"/>
+              <p:nvPr/>
+            </p:nvSpPr>
+            <p:spPr>
+              <a:xfrm>
+                <a:off x="6730016" y="2822774"/>
+                <a:ext cx="422039" cy="276999"/>
+              </a:xfrm>
+              <a:prstGeom prst="rect">
+                <a:avLst/>
+              </a:prstGeom>
+              <a:noFill/>
+            </p:spPr>
+            <p:txBody>
+              <a:bodyPr wrap="none" lIns="0" tIns="0" rIns="0" bIns="0" rtlCol="0">
+                <a:spAutoFit/>
+              </a:bodyPr>
+              <a:lstStyle/>
+              <a:p>
+                <a14:m>
+                  <m:oMathPara xmlns:m="http://schemas.openxmlformats.org/officeDocument/2006/math">
+                    <m:oMathParaPr>
+                      <m:jc m:val="centerGroup"/>
+                    </m:oMathParaPr>
+                    <m:oMath xmlns:m="http://schemas.openxmlformats.org/officeDocument/2006/math">
+                      <m:sSup>
+                        <m:sSupPr>
+                          <m:ctrlPr>
+                            <a:rPr lang="en-US" i="1" smtClean="0">
+                              <a:latin typeface="Cambria Math" panose="02040503050406030204" pitchFamily="18" charset="0"/>
+                            </a:rPr>
+                          </m:ctrlPr>
+                        </m:sSupPr>
+                        <m:e>
+                          <m:r>
+                            <a:rPr lang="en-US" b="0" i="1" smtClean="0">
+                              <a:latin typeface="Cambria Math" panose="02040503050406030204" pitchFamily="18" charset="0"/>
+                            </a:rPr>
+                            <m:t>45</m:t>
+                          </m:r>
+                        </m:e>
+                        <m:sup>
+                          <m:r>
+                            <a:rPr lang="en-US" b="0" i="1" smtClean="0">
+                              <a:latin typeface="Cambria Math" panose="02040503050406030204" pitchFamily="18" charset="0"/>
+                            </a:rPr>
+                            <m:t>𝑜</m:t>
+                          </m:r>
+                        </m:sup>
+                      </m:sSup>
+                    </m:oMath>
+                  </m:oMathPara>
+                </a14:m>
+                <a:endParaRPr lang="en-US" dirty="0"/>
+              </a:p>
+            </p:txBody>
+          </p:sp>
+        </mc:Choice>
+        <mc:Fallback>
+          <p:sp>
+            <p:nvSpPr>
+              <p:cNvPr id="37" name="TextBox 36">
+                <a:extLst>
+                  <a:ext uri="{FF2B5EF4-FFF2-40B4-BE49-F238E27FC236}">
+                    <a16:creationId xmlns:a16="http://schemas.microsoft.com/office/drawing/2014/main" id="{A1CECEE8-F115-705B-83D6-A2BEAD576B0F}"/>
+                  </a:ext>
+                </a:extLst>
+              </p:cNvPr>
+              <p:cNvSpPr txBox="1">
+                <a:spLocks noRot="1" noChangeAspect="1" noMove="1" noResize="1" noEditPoints="1" noAdjustHandles="1" noChangeArrowheads="1" noChangeShapeType="1" noTextEdit="1"/>
+              </p:cNvSpPr>
+              <p:nvPr/>
+            </p:nvSpPr>
+            <p:spPr>
+              <a:xfrm>
+                <a:off x="6730016" y="2822774"/>
+                <a:ext cx="422039" cy="276999"/>
+              </a:xfrm>
+              <a:prstGeom prst="rect">
+                <a:avLst/>
+              </a:prstGeom>
+              <a:blipFill>
+                <a:blip r:embed="rId9"/>
+                <a:stretch>
+                  <a:fillRect l="-13043" r="-2899" b="-8889"/>
+                </a:stretch>
+              </a:blipFill>
+            </p:spPr>
+            <p:txBody>
+              <a:bodyPr/>
+              <a:lstStyle/>
+              <a:p>
+                <a:r>
+                  <a:rPr lang="en-US">
+                    <a:noFill/>
+                  </a:rPr>
+                  <a:t> </a:t>
+                </a:r>
+              </a:p>
+            </p:txBody>
+          </p:sp>
+        </mc:Fallback>
+      </mc:AlternateContent>
+      <mc:AlternateContent xmlns:mc="http://schemas.openxmlformats.org/markup-compatibility/2006">
+        <mc:Choice xmlns:a14="http://schemas.microsoft.com/office/drawing/2010/main" Requires="a14">
+          <p:sp>
+            <p:nvSpPr>
+              <p:cNvPr id="39" name="TextBox 38">
+                <a:extLst>
+                  <a:ext uri="{FF2B5EF4-FFF2-40B4-BE49-F238E27FC236}">
+                    <a16:creationId xmlns:a16="http://schemas.microsoft.com/office/drawing/2014/main" id="{0E0A093F-E218-A0D1-DE7B-C0F28C8F1F1C}"/>
+                  </a:ext>
+                </a:extLst>
+              </p:cNvPr>
+              <p:cNvSpPr txBox="1"/>
+              <p:nvPr/>
+            </p:nvSpPr>
+            <p:spPr>
+              <a:xfrm>
+                <a:off x="6694430" y="3116616"/>
+                <a:ext cx="287322" cy="276999"/>
+              </a:xfrm>
+              <a:prstGeom prst="rect">
+                <a:avLst/>
+              </a:prstGeom>
+              <a:noFill/>
+            </p:spPr>
+            <p:txBody>
+              <a:bodyPr wrap="none" lIns="0" tIns="0" rIns="0" bIns="0" rtlCol="0">
+                <a:spAutoFit/>
+              </a:bodyPr>
+              <a:lstStyle/>
+              <a:p>
+                <a14:m>
+                  <m:oMathPara xmlns:m="http://schemas.openxmlformats.org/officeDocument/2006/math">
+                    <m:oMathParaPr>
+                      <m:jc m:val="centerGroup"/>
+                    </m:oMathParaPr>
+                    <m:oMath xmlns:m="http://schemas.openxmlformats.org/officeDocument/2006/math">
+                      <m:sSub>
+                        <m:sSubPr>
+                          <m:ctrlPr>
+                            <a:rPr lang="en-US" i="1" smtClean="0">
+                              <a:latin typeface="Cambria Math" panose="02040503050406030204" pitchFamily="18" charset="0"/>
+                            </a:rPr>
+                          </m:ctrlPr>
+                        </m:sSubPr>
+                        <m:e>
+                          <m:acc>
+                            <m:accPr>
+                              <m:chr m:val="̂"/>
+                              <m:ctrlPr>
+                                <a:rPr lang="en-US" i="1">
+                                  <a:latin typeface="Cambria Math" panose="02040503050406030204" pitchFamily="18" charset="0"/>
+                                </a:rPr>
+                              </m:ctrlPr>
+                            </m:accPr>
+                            <m:e>
+                              <m:r>
+                                <a:rPr lang="en-US" b="0" i="1" smtClean="0">
+                                  <a:latin typeface="Cambria Math" panose="02040503050406030204" pitchFamily="18" charset="0"/>
+                                </a:rPr>
+                                <m:t>𝑧</m:t>
+                              </m:r>
+                            </m:e>
+                          </m:acc>
+                        </m:e>
+                        <m:sub>
+                          <m:r>
+                            <a:rPr lang="en-US" i="1">
+                              <a:latin typeface="Cambria Math" panose="02040503050406030204" pitchFamily="18" charset="0"/>
+                            </a:rPr>
+                            <m:t>𝐵</m:t>
+                          </m:r>
+                        </m:sub>
+                      </m:sSub>
+                    </m:oMath>
+                  </m:oMathPara>
+                </a14:m>
+                <a:endParaRPr lang="en-US" dirty="0"/>
+              </a:p>
+            </p:txBody>
+          </p:sp>
+        </mc:Choice>
+        <mc:Fallback>
+          <p:sp>
+            <p:nvSpPr>
+              <p:cNvPr id="39" name="TextBox 38">
+                <a:extLst>
+                  <a:ext uri="{FF2B5EF4-FFF2-40B4-BE49-F238E27FC236}">
+                    <a16:creationId xmlns:a16="http://schemas.microsoft.com/office/drawing/2014/main" id="{0E0A093F-E218-A0D1-DE7B-C0F28C8F1F1C}"/>
+                  </a:ext>
+                </a:extLst>
+              </p:cNvPr>
+              <p:cNvSpPr txBox="1">
+                <a:spLocks noRot="1" noChangeAspect="1" noMove="1" noResize="1" noEditPoints="1" noAdjustHandles="1" noChangeArrowheads="1" noChangeShapeType="1" noTextEdit="1"/>
+              </p:cNvSpPr>
+              <p:nvPr/>
+            </p:nvSpPr>
+            <p:spPr>
+              <a:xfrm>
+                <a:off x="6694430" y="3116616"/>
+                <a:ext cx="287322" cy="276999"/>
+              </a:xfrm>
+              <a:prstGeom prst="rect">
+                <a:avLst/>
+              </a:prstGeom>
+              <a:blipFill>
+                <a:blip r:embed="rId10"/>
+                <a:stretch>
+                  <a:fillRect l="-12766" t="-23913" r="-70213" b="-15217"/>
+                </a:stretch>
+              </a:blipFill>
+            </p:spPr>
+            <p:txBody>
+              <a:bodyPr/>
+              <a:lstStyle/>
+              <a:p>
+                <a:r>
+                  <a:rPr lang="en-US">
+                    <a:noFill/>
+                  </a:rPr>
+                  <a:t> </a:t>
+                </a:r>
+              </a:p>
+            </p:txBody>
+          </p:sp>
+        </mc:Fallback>
+      </mc:AlternateContent>
+    </p:spTree>
+    <p:extLst>
+      <p:ext uri="{BB962C8B-B14F-4D97-AF65-F5344CB8AC3E}">
+        <p14:creationId xmlns:p14="http://schemas.microsoft.com/office/powerpoint/2010/main" val="2088032270"/>
       </p:ext>
     </p:extLst>
   </p:cSld>

</xml_diff>